<commit_message>
Front end pic updated a bit, e.g. port numbers added
</commit_message>
<xml_diff>
--- a/FrontEndPic_ReactRedux_Ajax_toBackend.pptx
+++ b/FrontEndPic_ReactRedux_Ajax_toBackend.pptx
@@ -259,7 +259,7 @@
           <a:p>
             <a:fld id="{FB0A2D85-4650-4612-BC00-0AA7D4877DCB}" type="datetimeFigureOut">
               <a:rPr lang="en-US" smtClean="0"/>
-              <a:t>4/15/2019</a:t>
+              <a:t>4/18/2019</a:t>
             </a:fld>
             <a:endParaRPr lang="en-US"/>
           </a:p>
@@ -457,7 +457,7 @@
           <a:p>
             <a:fld id="{FB0A2D85-4650-4612-BC00-0AA7D4877DCB}" type="datetimeFigureOut">
               <a:rPr lang="en-US" smtClean="0"/>
-              <a:t>4/15/2019</a:t>
+              <a:t>4/18/2019</a:t>
             </a:fld>
             <a:endParaRPr lang="en-US"/>
           </a:p>
@@ -665,7 +665,7 @@
           <a:p>
             <a:fld id="{FB0A2D85-4650-4612-BC00-0AA7D4877DCB}" type="datetimeFigureOut">
               <a:rPr lang="en-US" smtClean="0"/>
-              <a:t>4/15/2019</a:t>
+              <a:t>4/18/2019</a:t>
             </a:fld>
             <a:endParaRPr lang="en-US"/>
           </a:p>
@@ -863,7 +863,7 @@
           <a:p>
             <a:fld id="{FB0A2D85-4650-4612-BC00-0AA7D4877DCB}" type="datetimeFigureOut">
               <a:rPr lang="en-US" smtClean="0"/>
-              <a:t>4/15/2019</a:t>
+              <a:t>4/18/2019</a:t>
             </a:fld>
             <a:endParaRPr lang="en-US"/>
           </a:p>
@@ -1138,7 +1138,7 @@
           <a:p>
             <a:fld id="{FB0A2D85-4650-4612-BC00-0AA7D4877DCB}" type="datetimeFigureOut">
               <a:rPr lang="en-US" smtClean="0"/>
-              <a:t>4/15/2019</a:t>
+              <a:t>4/18/2019</a:t>
             </a:fld>
             <a:endParaRPr lang="en-US"/>
           </a:p>
@@ -1403,7 +1403,7 @@
           <a:p>
             <a:fld id="{FB0A2D85-4650-4612-BC00-0AA7D4877DCB}" type="datetimeFigureOut">
               <a:rPr lang="en-US" smtClean="0"/>
-              <a:t>4/15/2019</a:t>
+              <a:t>4/18/2019</a:t>
             </a:fld>
             <a:endParaRPr lang="en-US"/>
           </a:p>
@@ -1815,7 +1815,7 @@
           <a:p>
             <a:fld id="{FB0A2D85-4650-4612-BC00-0AA7D4877DCB}" type="datetimeFigureOut">
               <a:rPr lang="en-US" smtClean="0"/>
-              <a:t>4/15/2019</a:t>
+              <a:t>4/18/2019</a:t>
             </a:fld>
             <a:endParaRPr lang="en-US"/>
           </a:p>
@@ -1956,7 +1956,7 @@
           <a:p>
             <a:fld id="{FB0A2D85-4650-4612-BC00-0AA7D4877DCB}" type="datetimeFigureOut">
               <a:rPr lang="en-US" smtClean="0"/>
-              <a:t>4/15/2019</a:t>
+              <a:t>4/18/2019</a:t>
             </a:fld>
             <a:endParaRPr lang="en-US"/>
           </a:p>
@@ -2069,7 +2069,7 @@
           <a:p>
             <a:fld id="{FB0A2D85-4650-4612-BC00-0AA7D4877DCB}" type="datetimeFigureOut">
               <a:rPr lang="en-US" smtClean="0"/>
-              <a:t>4/15/2019</a:t>
+              <a:t>4/18/2019</a:t>
             </a:fld>
             <a:endParaRPr lang="en-US"/>
           </a:p>
@@ -2380,7 +2380,7 @@
           <a:p>
             <a:fld id="{FB0A2D85-4650-4612-BC00-0AA7D4877DCB}" type="datetimeFigureOut">
               <a:rPr lang="en-US" smtClean="0"/>
-              <a:t>4/15/2019</a:t>
+              <a:t>4/18/2019</a:t>
             </a:fld>
             <a:endParaRPr lang="en-US"/>
           </a:p>
@@ -2668,7 +2668,7 @@
           <a:p>
             <a:fld id="{FB0A2D85-4650-4612-BC00-0AA7D4877DCB}" type="datetimeFigureOut">
               <a:rPr lang="en-US" smtClean="0"/>
-              <a:t>4/15/2019</a:t>
+              <a:t>4/18/2019</a:t>
             </a:fld>
             <a:endParaRPr lang="en-US"/>
           </a:p>
@@ -2909,7 +2909,7 @@
           <a:p>
             <a:fld id="{FB0A2D85-4650-4612-BC00-0AA7D4877DCB}" type="datetimeFigureOut">
               <a:rPr lang="en-US" smtClean="0"/>
-              <a:t>4/15/2019</a:t>
+              <a:t>4/18/2019</a:t>
             </a:fld>
             <a:endParaRPr lang="en-US"/>
           </a:p>
@@ -6551,12 +6551,12 @@
               </a:rPr>
             </a:br>
             <a:r>
-              <a:rPr lang="en-US" sz="1100" err="1" smtClean="0">
+              <a:rPr lang="en-US" sz="1100" smtClean="0">
                 <a:solidFill>
                   <a:schemeClr val="tx1"/>
                 </a:solidFill>
               </a:rPr>
-              <a:t>Hapi</a:t>
+              <a:t>Express</a:t>
             </a:r>
             <a:r>
               <a:rPr lang="en-US" sz="1100" smtClean="0">
@@ -6574,7 +6574,7 @@
               </a:rPr>
             </a:br>
             <a:r>
-              <a:rPr lang="en-US" sz="1100" err="1" smtClean="0">
+              <a:rPr lang="en-US" sz="1100" strike="sngStrike" smtClean="0">
                 <a:solidFill>
                   <a:schemeClr val="tx1"/>
                 </a:solidFill>
@@ -9029,43 +9029,6 @@
       </p:sp>
       <p:sp>
         <p:nvSpPr>
-          <p:cNvPr id="44" name="Rectangle 43"/>
-          <p:cNvSpPr/>
-          <p:nvPr/>
-        </p:nvSpPr>
-        <p:spPr>
-          <a:xfrm>
-            <a:off x="8762920" y="6165352"/>
-            <a:ext cx="3244353" cy="369332"/>
-          </a:xfrm>
-          <a:prstGeom prst="rect">
-            <a:avLst/>
-          </a:prstGeom>
-        </p:spPr>
-        <p:txBody>
-          <a:bodyPr wrap="square">
-            <a:spAutoFit/>
-          </a:bodyPr>
-          <a:lstStyle/>
-          <a:p>
-            <a:r>
-              <a:rPr lang="fi-FI" b="1" smtClean="0">
-                <a:solidFill>
-                  <a:srgbClr val="FF0000"/>
-                </a:solidFill>
-              </a:rPr>
-              <a:t>NOT COMPLETELY READY YET!!!</a:t>
-            </a:r>
-            <a:endParaRPr lang="fi-FI" b="1">
-              <a:solidFill>
-                <a:srgbClr val="FF0000"/>
-              </a:solidFill>
-            </a:endParaRPr>
-          </a:p>
-        </p:txBody>
-      </p:sp>
-      <p:sp>
-        <p:nvSpPr>
           <p:cNvPr id="111" name="Rectangle 110">
             <a:extLst>
               <a:ext uri="{FF2B5EF4-FFF2-40B4-BE49-F238E27FC236}">
@@ -10693,6 +10656,130 @@
           </a:fontRef>
         </p:style>
       </p:cxnSp>
+      <p:sp>
+        <p:nvSpPr>
+          <p:cNvPr id="184" name="Rectangle 183">
+            <a:extLst>
+              <a:ext uri="{FF2B5EF4-FFF2-40B4-BE49-F238E27FC236}">
+                <a16:creationId xmlns:a16="http://schemas.microsoft.com/office/drawing/2014/main" id="{68823CB5-2195-4260-A87A-B1CF268CAC6C}"/>
+              </a:ext>
+            </a:extLst>
+          </p:cNvPr>
+          <p:cNvSpPr/>
+          <p:nvPr/>
+        </p:nvSpPr>
+        <p:spPr>
+          <a:xfrm>
+            <a:off x="9862434" y="78894"/>
+            <a:ext cx="618524" cy="314155"/>
+          </a:xfrm>
+          <a:prstGeom prst="rect">
+            <a:avLst/>
+          </a:prstGeom>
+          <a:noFill/>
+          <a:ln w="12700">
+            <a:noFill/>
+          </a:ln>
+        </p:spPr>
+        <p:style>
+          <a:lnRef idx="2">
+            <a:schemeClr val="accent1">
+              <a:shade val="50000"/>
+            </a:schemeClr>
+          </a:lnRef>
+          <a:fillRef idx="1">
+            <a:schemeClr val="accent1"/>
+          </a:fillRef>
+          <a:effectRef idx="0">
+            <a:schemeClr val="accent1"/>
+          </a:effectRef>
+          <a:fontRef idx="minor">
+            <a:schemeClr val="lt1"/>
+          </a:fontRef>
+        </p:style>
+        <p:txBody>
+          <a:bodyPr rtlCol="0" anchor="ctr"/>
+          <a:lstStyle/>
+          <a:p>
+            <a:pPr algn="ctr"/>
+            <a:r>
+              <a:rPr lang="fi-FI" sz="1300" smtClean="0">
+                <a:solidFill>
+                  <a:schemeClr val="tx1"/>
+                </a:solidFill>
+              </a:rPr>
+              <a:t>:8787</a:t>
+            </a:r>
+            <a:endParaRPr lang="en-US" sz="1300">
+              <a:solidFill>
+                <a:schemeClr val="tx1"/>
+              </a:solidFill>
+            </a:endParaRPr>
+          </a:p>
+        </p:txBody>
+      </p:sp>
+      <p:sp>
+        <p:nvSpPr>
+          <p:cNvPr id="185" name="Rectangle 184">
+            <a:extLst>
+              <a:ext uri="{FF2B5EF4-FFF2-40B4-BE49-F238E27FC236}">
+                <a16:creationId xmlns:a16="http://schemas.microsoft.com/office/drawing/2014/main" id="{68823CB5-2195-4260-A87A-B1CF268CAC6C}"/>
+              </a:ext>
+            </a:extLst>
+          </p:cNvPr>
+          <p:cNvSpPr/>
+          <p:nvPr/>
+        </p:nvSpPr>
+        <p:spPr>
+          <a:xfrm>
+            <a:off x="1686791" y="91866"/>
+            <a:ext cx="618524" cy="314155"/>
+          </a:xfrm>
+          <a:prstGeom prst="rect">
+            <a:avLst/>
+          </a:prstGeom>
+          <a:noFill/>
+          <a:ln w="12700">
+            <a:noFill/>
+          </a:ln>
+        </p:spPr>
+        <p:style>
+          <a:lnRef idx="2">
+            <a:schemeClr val="accent1">
+              <a:shade val="50000"/>
+            </a:schemeClr>
+          </a:lnRef>
+          <a:fillRef idx="1">
+            <a:schemeClr val="accent1"/>
+          </a:fillRef>
+          <a:effectRef idx="0">
+            <a:schemeClr val="accent1"/>
+          </a:effectRef>
+          <a:fontRef idx="minor">
+            <a:schemeClr val="lt1"/>
+          </a:fontRef>
+        </p:style>
+        <p:txBody>
+          <a:bodyPr rtlCol="0" anchor="ctr"/>
+          <a:lstStyle/>
+          <a:p>
+            <a:pPr algn="ctr"/>
+            <a:r>
+              <a:rPr lang="fi-FI" sz="1300" smtClean="0">
+                <a:solidFill>
+                  <a:schemeClr val="tx1"/>
+                </a:solidFill>
+              </a:rPr>
+              <a:t>:8686</a:t>
+            </a:r>
+            <a:endParaRPr lang="en-US" sz="1300">
+              <a:solidFill>
+                <a:schemeClr val="tx1"/>
+              </a:solidFill>
+            </a:endParaRPr>
+          </a:p>
+        </p:txBody>
+      </p:sp>
     </p:spTree>
     <p:extLst>
       <p:ext uri="{BB962C8B-B14F-4D97-AF65-F5344CB8AC3E}">

</xml_diff>

<commit_message>
Front-end architecture pic clarified. E.g. numbers of 'steps' 1-4 added
</commit_message>
<xml_diff>
--- a/FrontEndPic_ReactRedux_Ajax_toBackend.pptx
+++ b/FrontEndPic_ReactRedux_Ajax_toBackend.pptx
@@ -259,7 +259,7 @@
           <a:p>
             <a:fld id="{FB0A2D85-4650-4612-BC00-0AA7D4877DCB}" type="datetimeFigureOut">
               <a:rPr lang="en-US" smtClean="0"/>
-              <a:t>4/18/2019</a:t>
+              <a:t>4/23/2019</a:t>
             </a:fld>
             <a:endParaRPr lang="en-US"/>
           </a:p>
@@ -457,7 +457,7 @@
           <a:p>
             <a:fld id="{FB0A2D85-4650-4612-BC00-0AA7D4877DCB}" type="datetimeFigureOut">
               <a:rPr lang="en-US" smtClean="0"/>
-              <a:t>4/18/2019</a:t>
+              <a:t>4/23/2019</a:t>
             </a:fld>
             <a:endParaRPr lang="en-US"/>
           </a:p>
@@ -665,7 +665,7 @@
           <a:p>
             <a:fld id="{FB0A2D85-4650-4612-BC00-0AA7D4877DCB}" type="datetimeFigureOut">
               <a:rPr lang="en-US" smtClean="0"/>
-              <a:t>4/18/2019</a:t>
+              <a:t>4/23/2019</a:t>
             </a:fld>
             <a:endParaRPr lang="en-US"/>
           </a:p>
@@ -863,7 +863,7 @@
           <a:p>
             <a:fld id="{FB0A2D85-4650-4612-BC00-0AA7D4877DCB}" type="datetimeFigureOut">
               <a:rPr lang="en-US" smtClean="0"/>
-              <a:t>4/18/2019</a:t>
+              <a:t>4/23/2019</a:t>
             </a:fld>
             <a:endParaRPr lang="en-US"/>
           </a:p>
@@ -1138,7 +1138,7 @@
           <a:p>
             <a:fld id="{FB0A2D85-4650-4612-BC00-0AA7D4877DCB}" type="datetimeFigureOut">
               <a:rPr lang="en-US" smtClean="0"/>
-              <a:t>4/18/2019</a:t>
+              <a:t>4/23/2019</a:t>
             </a:fld>
             <a:endParaRPr lang="en-US"/>
           </a:p>
@@ -1403,7 +1403,7 @@
           <a:p>
             <a:fld id="{FB0A2D85-4650-4612-BC00-0AA7D4877DCB}" type="datetimeFigureOut">
               <a:rPr lang="en-US" smtClean="0"/>
-              <a:t>4/18/2019</a:t>
+              <a:t>4/23/2019</a:t>
             </a:fld>
             <a:endParaRPr lang="en-US"/>
           </a:p>
@@ -1815,7 +1815,7 @@
           <a:p>
             <a:fld id="{FB0A2D85-4650-4612-BC00-0AA7D4877DCB}" type="datetimeFigureOut">
               <a:rPr lang="en-US" smtClean="0"/>
-              <a:t>4/18/2019</a:t>
+              <a:t>4/23/2019</a:t>
             </a:fld>
             <a:endParaRPr lang="en-US"/>
           </a:p>
@@ -1956,7 +1956,7 @@
           <a:p>
             <a:fld id="{FB0A2D85-4650-4612-BC00-0AA7D4877DCB}" type="datetimeFigureOut">
               <a:rPr lang="en-US" smtClean="0"/>
-              <a:t>4/18/2019</a:t>
+              <a:t>4/23/2019</a:t>
             </a:fld>
             <a:endParaRPr lang="en-US"/>
           </a:p>
@@ -2069,7 +2069,7 @@
           <a:p>
             <a:fld id="{FB0A2D85-4650-4612-BC00-0AA7D4877DCB}" type="datetimeFigureOut">
               <a:rPr lang="en-US" smtClean="0"/>
-              <a:t>4/18/2019</a:t>
+              <a:t>4/23/2019</a:t>
             </a:fld>
             <a:endParaRPr lang="en-US"/>
           </a:p>
@@ -2380,7 +2380,7 @@
           <a:p>
             <a:fld id="{FB0A2D85-4650-4612-BC00-0AA7D4877DCB}" type="datetimeFigureOut">
               <a:rPr lang="en-US" smtClean="0"/>
-              <a:t>4/18/2019</a:t>
+              <a:t>4/23/2019</a:t>
             </a:fld>
             <a:endParaRPr lang="en-US"/>
           </a:p>
@@ -2668,7 +2668,7 @@
           <a:p>
             <a:fld id="{FB0A2D85-4650-4612-BC00-0AA7D4877DCB}" type="datetimeFigureOut">
               <a:rPr lang="en-US" smtClean="0"/>
-              <a:t>4/18/2019</a:t>
+              <a:t>4/23/2019</a:t>
             </a:fld>
             <a:endParaRPr lang="en-US"/>
           </a:p>
@@ -2909,7 +2909,7 @@
           <a:p>
             <a:fld id="{FB0A2D85-4650-4612-BC00-0AA7D4877DCB}" type="datetimeFigureOut">
               <a:rPr lang="en-US" smtClean="0"/>
-              <a:t>4/18/2019</a:t>
+              <a:t>4/23/2019</a:t>
             </a:fld>
             <a:endParaRPr lang="en-US"/>
           </a:p>
@@ -5011,7 +5011,7 @@
         </p:nvSpPr>
         <p:spPr>
           <a:xfrm>
-            <a:off x="4385978" y="83477"/>
+            <a:off x="4929041" y="-98870"/>
             <a:ext cx="1909605" cy="461665"/>
           </a:xfrm>
           <a:prstGeom prst="rect">
@@ -5883,7 +5883,7 @@
         <p:spPr>
           <a:xfrm>
             <a:off x="7969347" y="1580892"/>
-            <a:ext cx="784763" cy="233421"/>
+            <a:ext cx="1350875" cy="323036"/>
           </a:xfrm>
           <a:prstGeom prst="rect">
             <a:avLst/>
@@ -5920,15 +5920,7 @@
                   <a:schemeClr val="tx1"/>
                 </a:solidFill>
               </a:rPr>
-              <a:t>Action </a:t>
-            </a:r>
-            <a:r>
-              <a:rPr lang="fi-FI" sz="1000" err="1" smtClean="0">
-                <a:solidFill>
-                  <a:schemeClr val="tx1"/>
-                </a:solidFill>
-              </a:rPr>
-              <a:t>dispatched</a:t>
+              <a:t>Action dispatched to redux store</a:t>
             </a:r>
             <a:endParaRPr lang="en-US" sz="1000">
               <a:solidFill>
@@ -6251,7 +6243,7 @@
         </p:nvSpPr>
         <p:spPr>
           <a:xfrm rot="16200000">
-            <a:off x="8965747" y="5067641"/>
+            <a:off x="9162522" y="2121297"/>
             <a:ext cx="1202531" cy="468253"/>
           </a:xfrm>
           <a:prstGeom prst="rect">
@@ -6557,14 +6549,6 @@
                 </a:solidFill>
               </a:rPr>
               <a:t>Express</a:t>
-            </a:r>
-            <a:r>
-              <a:rPr lang="en-US" sz="1100" smtClean="0">
-                <a:solidFill>
-                  <a:schemeClr val="tx1"/>
-                </a:solidFill>
-              </a:rPr>
-              <a:t/>
             </a:r>
             <a:br>
               <a:rPr lang="en-US" sz="1100" smtClean="0">
@@ -10773,6 +10757,323 @@
               <a:t>:8686</a:t>
             </a:r>
             <a:endParaRPr lang="en-US" sz="1300">
+              <a:solidFill>
+                <a:schemeClr val="tx1"/>
+              </a:solidFill>
+            </a:endParaRPr>
+          </a:p>
+        </p:txBody>
+      </p:sp>
+      <p:sp>
+        <p:nvSpPr>
+          <p:cNvPr id="11" name="Rectangle 10"/>
+          <p:cNvSpPr/>
+          <p:nvPr/>
+        </p:nvSpPr>
+        <p:spPr>
+          <a:xfrm>
+            <a:off x="5345791" y="976903"/>
+            <a:ext cx="494046" cy="369332"/>
+          </a:xfrm>
+          <a:prstGeom prst="rect">
+            <a:avLst/>
+          </a:prstGeom>
+        </p:spPr>
+        <p:txBody>
+          <a:bodyPr wrap="none">
+            <a:spAutoFit/>
+          </a:bodyPr>
+          <a:lstStyle/>
+          <a:p>
+            <a:r>
+              <a:rPr lang="fi-FI" smtClean="0">
+                <a:solidFill>
+                  <a:srgbClr val="0070C0"/>
+                </a:solidFill>
+              </a:rPr>
+              <a:t>”1”</a:t>
+            </a:r>
+            <a:endParaRPr lang="fi-FI">
+              <a:solidFill>
+                <a:srgbClr val="0070C0"/>
+              </a:solidFill>
+            </a:endParaRPr>
+          </a:p>
+        </p:txBody>
+      </p:sp>
+      <p:sp>
+        <p:nvSpPr>
+          <p:cNvPr id="186" name="Rectangle 185"/>
+          <p:cNvSpPr/>
+          <p:nvPr/>
+        </p:nvSpPr>
+        <p:spPr>
+          <a:xfrm>
+            <a:off x="9279011" y="233476"/>
+            <a:ext cx="494046" cy="369332"/>
+          </a:xfrm>
+          <a:prstGeom prst="rect">
+            <a:avLst/>
+          </a:prstGeom>
+        </p:spPr>
+        <p:txBody>
+          <a:bodyPr wrap="none">
+            <a:spAutoFit/>
+          </a:bodyPr>
+          <a:lstStyle/>
+          <a:p>
+            <a:r>
+              <a:rPr lang="fi-FI" smtClean="0">
+                <a:solidFill>
+                  <a:srgbClr val="0070C0"/>
+                </a:solidFill>
+              </a:rPr>
+              <a:t>”2”</a:t>
+            </a:r>
+            <a:endParaRPr lang="fi-FI">
+              <a:solidFill>
+                <a:srgbClr val="0070C0"/>
+              </a:solidFill>
+            </a:endParaRPr>
+          </a:p>
+        </p:txBody>
+      </p:sp>
+      <p:sp>
+        <p:nvSpPr>
+          <p:cNvPr id="187" name="Rectangle 186"/>
+          <p:cNvSpPr/>
+          <p:nvPr/>
+        </p:nvSpPr>
+        <p:spPr>
+          <a:xfrm>
+            <a:off x="8839178" y="1774287"/>
+            <a:ext cx="494046" cy="369332"/>
+          </a:xfrm>
+          <a:prstGeom prst="rect">
+            <a:avLst/>
+          </a:prstGeom>
+        </p:spPr>
+        <p:txBody>
+          <a:bodyPr wrap="none">
+            <a:spAutoFit/>
+          </a:bodyPr>
+          <a:lstStyle/>
+          <a:p>
+            <a:r>
+              <a:rPr lang="fi-FI" smtClean="0">
+                <a:solidFill>
+                  <a:srgbClr val="0070C0"/>
+                </a:solidFill>
+              </a:rPr>
+              <a:t>”3”</a:t>
+            </a:r>
+            <a:endParaRPr lang="fi-FI">
+              <a:solidFill>
+                <a:srgbClr val="0070C0"/>
+              </a:solidFill>
+            </a:endParaRPr>
+          </a:p>
+        </p:txBody>
+      </p:sp>
+      <p:sp>
+        <p:nvSpPr>
+          <p:cNvPr id="188" name="Rectangle 187"/>
+          <p:cNvSpPr/>
+          <p:nvPr/>
+        </p:nvSpPr>
+        <p:spPr>
+          <a:xfrm>
+            <a:off x="5018590" y="5933328"/>
+            <a:ext cx="494046" cy="369332"/>
+          </a:xfrm>
+          <a:prstGeom prst="rect">
+            <a:avLst/>
+          </a:prstGeom>
+        </p:spPr>
+        <p:txBody>
+          <a:bodyPr wrap="none">
+            <a:spAutoFit/>
+          </a:bodyPr>
+          <a:lstStyle/>
+          <a:p>
+            <a:r>
+              <a:rPr lang="fi-FI" smtClean="0">
+                <a:solidFill>
+                  <a:srgbClr val="0070C0"/>
+                </a:solidFill>
+              </a:rPr>
+              <a:t>”4”</a:t>
+            </a:r>
+            <a:endParaRPr lang="fi-FI">
+              <a:solidFill>
+                <a:srgbClr val="0070C0"/>
+              </a:solidFill>
+            </a:endParaRPr>
+          </a:p>
+        </p:txBody>
+      </p:sp>
+      <p:sp>
+        <p:nvSpPr>
+          <p:cNvPr id="189" name="Rectangle 188">
+            <a:extLst>
+              <a:ext uri="{FF2B5EF4-FFF2-40B4-BE49-F238E27FC236}">
+                <a16:creationId xmlns:a16="http://schemas.microsoft.com/office/drawing/2014/main" id="{81DBA5E4-AA13-452A-AB6A-11CDA743A6C4}"/>
+              </a:ext>
+            </a:extLst>
+          </p:cNvPr>
+          <p:cNvSpPr/>
+          <p:nvPr/>
+        </p:nvSpPr>
+        <p:spPr>
+          <a:xfrm>
+            <a:off x="7492544" y="3261998"/>
+            <a:ext cx="1284583" cy="150418"/>
+          </a:xfrm>
+          <a:prstGeom prst="rect">
+            <a:avLst/>
+          </a:prstGeom>
+          <a:noFill/>
+          <a:ln w="12700">
+            <a:noFill/>
+          </a:ln>
+        </p:spPr>
+        <p:style>
+          <a:lnRef idx="2">
+            <a:schemeClr val="accent1">
+              <a:shade val="50000"/>
+            </a:schemeClr>
+          </a:lnRef>
+          <a:fillRef idx="1">
+            <a:schemeClr val="accent1"/>
+          </a:fillRef>
+          <a:effectRef idx="0">
+            <a:schemeClr val="accent1"/>
+          </a:effectRef>
+          <a:fontRef idx="minor">
+            <a:schemeClr val="lt1"/>
+          </a:fontRef>
+        </p:style>
+        <p:txBody>
+          <a:bodyPr rtlCol="0" anchor="ctr"/>
+          <a:lstStyle/>
+          <a:p>
+            <a:pPr algn="ctr"/>
+            <a:r>
+              <a:rPr lang="fi-FI" sz="1000" smtClean="0">
+                <a:solidFill>
+                  <a:schemeClr val="tx1"/>
+                </a:solidFill>
+              </a:rPr>
+              <a:t>Redux </a:t>
+            </a:r>
+            <a:r>
+              <a:rPr lang="fi-FI" sz="1000" b="1" smtClean="0">
+                <a:solidFill>
+                  <a:schemeClr val="tx1"/>
+                </a:solidFill>
+              </a:rPr>
+              <a:t>store</a:t>
+            </a:r>
+            <a:endParaRPr lang="en-US" sz="1000" b="1">
+              <a:solidFill>
+                <a:schemeClr val="tx1"/>
+              </a:solidFill>
+            </a:endParaRPr>
+          </a:p>
+        </p:txBody>
+      </p:sp>
+      <p:cxnSp>
+        <p:nvCxnSpPr>
+          <p:cNvPr id="190" name="Straight Connector 189">
+            <a:extLst>
+              <a:ext uri="{FF2B5EF4-FFF2-40B4-BE49-F238E27FC236}">
+                <a16:creationId xmlns:a16="http://schemas.microsoft.com/office/drawing/2014/main" id="{AE99071E-67E6-425E-B694-6CA79B70A165}"/>
+              </a:ext>
+            </a:extLst>
+          </p:cNvPr>
+          <p:cNvCxnSpPr/>
+          <p:nvPr/>
+        </p:nvCxnSpPr>
+        <p:spPr>
+          <a:xfrm>
+            <a:off x="9779634" y="2320977"/>
+            <a:ext cx="2412366" cy="0"/>
+          </a:xfrm>
+          <a:prstGeom prst="line">
+            <a:avLst/>
+          </a:prstGeom>
+          <a:ln w="38100"/>
+        </p:spPr>
+        <p:style>
+          <a:lnRef idx="1">
+            <a:schemeClr val="dk1"/>
+          </a:lnRef>
+          <a:fillRef idx="0">
+            <a:schemeClr val="dk1"/>
+          </a:fillRef>
+          <a:effectRef idx="0">
+            <a:schemeClr val="dk1"/>
+          </a:effectRef>
+          <a:fontRef idx="minor">
+            <a:schemeClr val="tx1"/>
+          </a:fontRef>
+        </p:style>
+      </p:cxnSp>
+      <p:sp>
+        <p:nvSpPr>
+          <p:cNvPr id="191" name="Rectangle 190">
+            <a:extLst>
+              <a:ext uri="{FF2B5EF4-FFF2-40B4-BE49-F238E27FC236}">
+                <a16:creationId xmlns:a16="http://schemas.microsoft.com/office/drawing/2014/main" id="{DE036872-088C-40C7-9D5E-9F57E99E8DF5}"/>
+              </a:ext>
+            </a:extLst>
+          </p:cNvPr>
+          <p:cNvSpPr/>
+          <p:nvPr/>
+        </p:nvSpPr>
+        <p:spPr>
+          <a:xfrm>
+            <a:off x="10170671" y="2076348"/>
+            <a:ext cx="1202531" cy="468253"/>
+          </a:xfrm>
+          <a:prstGeom prst="rect">
+            <a:avLst/>
+          </a:prstGeom>
+          <a:noFill/>
+          <a:ln w="12700">
+            <a:noFill/>
+          </a:ln>
+        </p:spPr>
+        <p:style>
+          <a:lnRef idx="2">
+            <a:schemeClr val="accent1">
+              <a:shade val="50000"/>
+            </a:schemeClr>
+          </a:lnRef>
+          <a:fillRef idx="1">
+            <a:schemeClr val="accent1"/>
+          </a:fillRef>
+          <a:effectRef idx="0">
+            <a:schemeClr val="accent1"/>
+          </a:effectRef>
+          <a:fontRef idx="minor">
+            <a:schemeClr val="lt1"/>
+          </a:fontRef>
+        </p:style>
+        <p:txBody>
+          <a:bodyPr rtlCol="0" anchor="ctr"/>
+          <a:lstStyle/>
+          <a:p>
+            <a:pPr algn="ctr"/>
+            <a:r>
+              <a:rPr lang="fi-FI" sz="1700">
+                <a:solidFill>
+                  <a:schemeClr val="tx1"/>
+                </a:solidFill>
+              </a:rPr>
+              <a:t>INTERNET</a:t>
+            </a:r>
+            <a:endParaRPr lang="en-US" sz="1700">
               <a:solidFill>
                 <a:schemeClr val="tx1"/>
               </a:solidFill>

</xml_diff>

<commit_message>
Add 0. user interaction in the React-Redux big picture
</commit_message>
<xml_diff>
--- a/FrontEndPic_ReactRedux_Ajax_toBackend.pptx
+++ b/FrontEndPic_ReactRedux_Ajax_toBackend.pptx
@@ -259,7 +259,7 @@
           <a:p>
             <a:fld id="{FB0A2D85-4650-4612-BC00-0AA7D4877DCB}" type="datetimeFigureOut">
               <a:rPr lang="en-US" smtClean="0"/>
-              <a:t>4/23/2019</a:t>
+              <a:t>10/12/2019</a:t>
             </a:fld>
             <a:endParaRPr lang="en-US"/>
           </a:p>
@@ -457,7 +457,7 @@
           <a:p>
             <a:fld id="{FB0A2D85-4650-4612-BC00-0AA7D4877DCB}" type="datetimeFigureOut">
               <a:rPr lang="en-US" smtClean="0"/>
-              <a:t>4/23/2019</a:t>
+              <a:t>10/12/2019</a:t>
             </a:fld>
             <a:endParaRPr lang="en-US"/>
           </a:p>
@@ -665,7 +665,7 @@
           <a:p>
             <a:fld id="{FB0A2D85-4650-4612-BC00-0AA7D4877DCB}" type="datetimeFigureOut">
               <a:rPr lang="en-US" smtClean="0"/>
-              <a:t>4/23/2019</a:t>
+              <a:t>10/12/2019</a:t>
             </a:fld>
             <a:endParaRPr lang="en-US"/>
           </a:p>
@@ -863,7 +863,7 @@
           <a:p>
             <a:fld id="{FB0A2D85-4650-4612-BC00-0AA7D4877DCB}" type="datetimeFigureOut">
               <a:rPr lang="en-US" smtClean="0"/>
-              <a:t>4/23/2019</a:t>
+              <a:t>10/12/2019</a:t>
             </a:fld>
             <a:endParaRPr lang="en-US"/>
           </a:p>
@@ -1138,7 +1138,7 @@
           <a:p>
             <a:fld id="{FB0A2D85-4650-4612-BC00-0AA7D4877DCB}" type="datetimeFigureOut">
               <a:rPr lang="en-US" smtClean="0"/>
-              <a:t>4/23/2019</a:t>
+              <a:t>10/12/2019</a:t>
             </a:fld>
             <a:endParaRPr lang="en-US"/>
           </a:p>
@@ -1403,7 +1403,7 @@
           <a:p>
             <a:fld id="{FB0A2D85-4650-4612-BC00-0AA7D4877DCB}" type="datetimeFigureOut">
               <a:rPr lang="en-US" smtClean="0"/>
-              <a:t>4/23/2019</a:t>
+              <a:t>10/12/2019</a:t>
             </a:fld>
             <a:endParaRPr lang="en-US"/>
           </a:p>
@@ -1815,7 +1815,7 @@
           <a:p>
             <a:fld id="{FB0A2D85-4650-4612-BC00-0AA7D4877DCB}" type="datetimeFigureOut">
               <a:rPr lang="en-US" smtClean="0"/>
-              <a:t>4/23/2019</a:t>
+              <a:t>10/12/2019</a:t>
             </a:fld>
             <a:endParaRPr lang="en-US"/>
           </a:p>
@@ -1956,7 +1956,7 @@
           <a:p>
             <a:fld id="{FB0A2D85-4650-4612-BC00-0AA7D4877DCB}" type="datetimeFigureOut">
               <a:rPr lang="en-US" smtClean="0"/>
-              <a:t>4/23/2019</a:t>
+              <a:t>10/12/2019</a:t>
             </a:fld>
             <a:endParaRPr lang="en-US"/>
           </a:p>
@@ -2069,7 +2069,7 @@
           <a:p>
             <a:fld id="{FB0A2D85-4650-4612-BC00-0AA7D4877DCB}" type="datetimeFigureOut">
               <a:rPr lang="en-US" smtClean="0"/>
-              <a:t>4/23/2019</a:t>
+              <a:t>10/12/2019</a:t>
             </a:fld>
             <a:endParaRPr lang="en-US"/>
           </a:p>
@@ -2380,7 +2380,7 @@
           <a:p>
             <a:fld id="{FB0A2D85-4650-4612-BC00-0AA7D4877DCB}" type="datetimeFigureOut">
               <a:rPr lang="en-US" smtClean="0"/>
-              <a:t>4/23/2019</a:t>
+              <a:t>10/12/2019</a:t>
             </a:fld>
             <a:endParaRPr lang="en-US"/>
           </a:p>
@@ -2668,7 +2668,7 @@
           <a:p>
             <a:fld id="{FB0A2D85-4650-4612-BC00-0AA7D4877DCB}" type="datetimeFigureOut">
               <a:rPr lang="en-US" smtClean="0"/>
-              <a:t>4/23/2019</a:t>
+              <a:t>10/12/2019</a:t>
             </a:fld>
             <a:endParaRPr lang="en-US"/>
           </a:p>
@@ -2909,7 +2909,7 @@
           <a:p>
             <a:fld id="{FB0A2D85-4650-4612-BC00-0AA7D4877DCB}" type="datetimeFigureOut">
               <a:rPr lang="en-US" smtClean="0"/>
-              <a:t>4/23/2019</a:t>
+              <a:t>10/12/2019</a:t>
             </a:fld>
             <a:endParaRPr lang="en-US"/>
           </a:p>
@@ -3340,7 +3340,7 @@
         </p:nvSpPr>
         <p:spPr>
           <a:xfrm>
-            <a:off x="10069203" y="2518735"/>
+            <a:off x="10078717" y="2518835"/>
             <a:ext cx="2004130" cy="2689658"/>
           </a:xfrm>
           <a:prstGeom prst="rect">
@@ -3719,7 +3719,7 @@
           <a:p>
             <a:pPr algn="ctr"/>
             <a:r>
-              <a:rPr lang="fi-FI" sz="1400" err="1" smtClean="0"/>
+              <a:rPr lang="fi-FI" sz="1400" err="1"/>
               <a:t>CategoryAdd</a:t>
             </a:r>
             <a:endParaRPr lang="en-US" sz="1400"/>
@@ -3995,7 +3995,7 @@
               <a:t> </a:t>
             </a:r>
             <a:r>
-              <a:rPr lang="fi-FI" sz="1100" err="1" smtClean="0">
+              <a:rPr lang="fi-FI" sz="1100" err="1">
                 <a:solidFill>
                   <a:sysClr val="windowText" lastClr="000000"/>
                 </a:solidFill>
@@ -4270,7 +4270,7 @@
           <a:lstStyle/>
           <a:p>
             <a:r>
-              <a:rPr lang="fi-FI" err="1" smtClean="0"/>
+              <a:rPr lang="fi-FI" err="1"/>
               <a:t>CategoryList</a:t>
             </a:r>
             <a:endParaRPr lang="en-US"/>
@@ -4306,7 +4306,7 @@
           <a:lstStyle/>
           <a:p>
             <a:r>
-              <a:rPr lang="fi-FI" err="1" smtClean="0"/>
+              <a:rPr lang="fi-FI" err="1"/>
               <a:t>CategoryListItem</a:t>
             </a:r>
             <a:endParaRPr lang="en-US"/>
@@ -4349,11 +4349,7 @@
           <a:p>
             <a:r>
               <a:rPr lang="fi-FI"/>
-              <a:t>C</a:t>
-            </a:r>
-            <a:r>
-              <a:rPr lang="fi-FI" smtClean="0"/>
-              <a:t>omponents</a:t>
+              <a:t>Components</a:t>
             </a:r>
             <a:endParaRPr lang="en-US"/>
           </a:p>
@@ -4560,7 +4556,7 @@
           <a:lstStyle/>
           <a:p>
             <a:r>
-              <a:rPr lang="fi-FI" sz="1400" smtClean="0"/>
+              <a:rPr lang="fi-FI" sz="1400"/>
               <a:t>* of </a:t>
             </a:r>
             <a:r>
@@ -4572,40 +4568,36 @@
               <a:t> </a:t>
             </a:r>
             <a:r>
-              <a:rPr lang="fi-FI" sz="1400" err="1" smtClean="0"/>
+              <a:rPr lang="fi-FI" sz="1400" err="1"/>
               <a:t>later</a:t>
             </a:r>
             <a:r>
-              <a:rPr lang="fi-FI" sz="1400" smtClean="0"/>
+              <a:rPr lang="fi-FI" sz="1400"/>
               <a:t> </a:t>
             </a:r>
             <a:r>
-              <a:rPr lang="fi-FI" sz="1400" err="1" smtClean="0"/>
+              <a:rPr lang="fi-FI" sz="1400" err="1"/>
               <a:t>we</a:t>
             </a:r>
             <a:r>
-              <a:rPr lang="fi-FI" sz="1400" smtClean="0"/>
+              <a:rPr lang="fi-FI" sz="1400"/>
               <a:t> </a:t>
             </a:r>
             <a:r>
-              <a:rPr lang="fi-FI" sz="1400" err="1" smtClean="0"/>
+              <a:rPr lang="fi-FI" sz="1400" err="1"/>
               <a:t>use</a:t>
             </a:r>
             <a:r>
-              <a:rPr lang="fi-FI" sz="1400" smtClean="0"/>
+              <a:rPr lang="fi-FI" sz="1400"/>
               <a:t> </a:t>
             </a:r>
             <a:r>
-              <a:rPr lang="fi-FI" sz="1400" err="1" smtClean="0"/>
+              <a:rPr lang="fi-FI" sz="1400" err="1"/>
               <a:t>id:s</a:t>
             </a:r>
             <a:r>
-              <a:rPr lang="fi-FI" sz="1400" smtClean="0"/>
-              <a:t> </a:t>
-            </a:r>
-            <a:r>
               <a:rPr lang="fi-FI" sz="1400"/>
-              <a:t>generated </a:t>
+              <a:t> generated </a:t>
             </a:r>
             <a:r>
               <a:rPr lang="fi-FI" sz="1400" err="1"/>
@@ -4616,38 +4608,38 @@
               <a:t> </a:t>
             </a:r>
             <a:r>
-              <a:rPr lang="fi-FI" sz="1400" err="1" smtClean="0"/>
+              <a:rPr lang="fi-FI" sz="1400" err="1"/>
               <a:t>the</a:t>
             </a:r>
             <a:r>
-              <a:rPr lang="fi-FI" sz="1400" smtClean="0"/>
+              <a:rPr lang="fi-FI" sz="1400"/>
               <a:t> </a:t>
             </a:r>
             <a:br>
-              <a:rPr lang="fi-FI" sz="1400" smtClean="0"/>
+              <a:rPr lang="fi-FI" sz="1400"/>
             </a:br>
             <a:r>
-              <a:rPr lang="fi-FI" sz="1400" smtClean="0"/>
+              <a:rPr lang="fi-FI" sz="1400"/>
               <a:t>DBMS, </a:t>
             </a:r>
             <a:r>
-              <a:rPr lang="fi-FI" sz="1400" err="1" smtClean="0"/>
+              <a:rPr lang="fi-FI" sz="1400" err="1"/>
               <a:t>not</a:t>
             </a:r>
             <a:r>
-              <a:rPr lang="fi-FI" sz="1400" smtClean="0"/>
+              <a:rPr lang="fi-FI" sz="1400"/>
               <a:t> </a:t>
             </a:r>
             <a:r>
-              <a:rPr lang="fi-FI" sz="1400" err="1" smtClean="0"/>
+              <a:rPr lang="fi-FI" sz="1400" err="1"/>
               <a:t>from</a:t>
             </a:r>
             <a:r>
-              <a:rPr lang="fi-FI" sz="1400" smtClean="0"/>
+              <a:rPr lang="fi-FI" sz="1400"/>
               <a:t> input </a:t>
             </a:r>
             <a:r>
-              <a:rPr lang="fi-FI" sz="1400" err="1" smtClean="0"/>
+              <a:rPr lang="fi-FI" sz="1400" err="1"/>
               <a:t>fields</a:t>
             </a:r>
             <a:endParaRPr lang="en-US" sz="1400"/>
@@ -4713,7 +4705,7 @@
               <a:t>Action </a:t>
             </a:r>
             <a:r>
-              <a:rPr lang="fi-FI" sz="1300" err="1" smtClean="0">
+              <a:rPr lang="fi-FI" sz="1300" err="1">
                 <a:solidFill>
                   <a:schemeClr val="tx1"/>
                 </a:solidFill>
@@ -4721,7 +4713,7 @@
               <a:t>handler</a:t>
             </a:r>
             <a:r>
-              <a:rPr lang="fi-FI" sz="1300" smtClean="0">
+              <a:rPr lang="fi-FI" sz="1300">
                 <a:solidFill>
                   <a:schemeClr val="tx1"/>
                 </a:solidFill>
@@ -4729,7 +4721,7 @@
               <a:t>, </a:t>
             </a:r>
             <a:r>
-              <a:rPr lang="fi-FI" sz="1300" err="1" smtClean="0">
+              <a:rPr lang="fi-FI" sz="1300" err="1">
                 <a:solidFill>
                   <a:schemeClr val="tx1"/>
                 </a:solidFill>
@@ -4737,7 +4729,7 @@
               <a:t>dispatching</a:t>
             </a:r>
             <a:r>
-              <a:rPr lang="fi-FI" sz="1300" smtClean="0">
+              <a:rPr lang="fi-FI" sz="1300">
                 <a:solidFill>
                   <a:schemeClr val="tx1"/>
                 </a:solidFill>
@@ -4745,7 +4737,7 @@
               <a:t> Action </a:t>
             </a:r>
             <a:r>
-              <a:rPr lang="fi-FI" sz="1300" err="1" smtClean="0">
+              <a:rPr lang="fi-FI" sz="1300" err="1">
                 <a:solidFill>
                   <a:schemeClr val="tx1"/>
                 </a:solidFill>
@@ -4795,33 +4787,29 @@
           </a:p>
           <a:p>
             <a:r>
-              <a:rPr lang="fi-FI" sz="1000" smtClean="0"/>
+              <a:rPr lang="fi-FI" sz="1000"/>
               <a:t>* </a:t>
             </a:r>
             <a:r>
-              <a:rPr lang="fi-FI" sz="1000" err="1" smtClean="0"/>
+              <a:rPr lang="fi-FI" sz="1000" err="1"/>
               <a:t>Type</a:t>
             </a:r>
             <a:r>
-              <a:rPr lang="fi-FI" sz="1000" smtClean="0"/>
-              <a:t>= </a:t>
-            </a:r>
-            <a:r>
               <a:rPr lang="fi-FI" sz="1000"/>
-              <a:t>name</a:t>
-            </a:r>
-          </a:p>
-          <a:p>
-            <a:r>
-              <a:rPr lang="fi-FI" sz="1000" smtClean="0"/>
+              <a:t>= name</a:t>
+            </a:r>
+          </a:p>
+          <a:p>
+            <a:r>
+              <a:rPr lang="fi-FI" sz="1000"/>
               <a:t>* </a:t>
             </a:r>
             <a:r>
-              <a:rPr lang="fi-FI" sz="1000" err="1" smtClean="0"/>
+              <a:rPr lang="fi-FI" sz="1000" err="1"/>
               <a:t>Payload</a:t>
             </a:r>
             <a:r>
-              <a:rPr lang="fi-FI" sz="1000" smtClean="0"/>
+              <a:rPr lang="fi-FI" sz="1000"/>
               <a:t>=data</a:t>
             </a:r>
             <a:endParaRPr lang="en-US" sz="1000"/>
@@ -4963,23 +4951,7 @@
                   <a:srgbClr val="FF0000"/>
                 </a:solidFill>
               </a:rPr>
-              <a:t> </a:t>
-            </a:r>
-            <a:r>
-              <a:rPr lang="fi-FI" sz="1000" smtClean="0">
-                <a:solidFill>
-                  <a:srgbClr val="FF0000"/>
-                </a:solidFill>
-              </a:rPr>
-              <a:t>~ </a:t>
-            </a:r>
-            <a:r>
-              <a:rPr lang="fi-FI" sz="1000">
-                <a:solidFill>
-                  <a:srgbClr val="FF0000"/>
-                </a:solidFill>
-              </a:rPr>
-              <a:t>`page` in a </a:t>
+              <a:t> ~ `page` in a </a:t>
             </a:r>
             <a:r>
               <a:rPr lang="fi-FI" sz="1000" u="sng">
@@ -5199,7 +5171,7 @@
           <a:lstStyle/>
           <a:p>
             <a:r>
-              <a:rPr lang="fi-FI" sz="1300" smtClean="0">
+              <a:rPr lang="fi-FI" sz="1300">
                 <a:solidFill>
                   <a:schemeClr val="tx1"/>
                 </a:solidFill>
@@ -5213,7 +5185,7 @@
               <a:buChar char="•"/>
             </a:pPr>
             <a:r>
-              <a:rPr lang="fi-FI" sz="1300" smtClean="0">
+              <a:rPr lang="fi-FI" sz="1300">
                 <a:solidFill>
                   <a:schemeClr val="tx1"/>
                 </a:solidFill>
@@ -5227,7 +5199,7 @@
               <a:buChar char="•"/>
             </a:pPr>
             <a:r>
-              <a:rPr lang="fi-FI" sz="1300" smtClean="0">
+              <a:rPr lang="fi-FI" sz="1300">
                 <a:solidFill>
                   <a:schemeClr val="tx1"/>
                 </a:solidFill>
@@ -5391,15 +5363,7 @@
                   <a:schemeClr val="tx1"/>
                 </a:solidFill>
               </a:rPr>
-              <a:t>c</a:t>
-            </a:r>
-            <a:r>
-              <a:rPr lang="fi-FI" sz="1300" err="1" smtClean="0">
-                <a:solidFill>
-                  <a:schemeClr val="tx1"/>
-                </a:solidFill>
-              </a:rPr>
-              <a:t>ategories</a:t>
+              <a:t>categories</a:t>
             </a:r>
             <a:endParaRPr lang="fi-FI" sz="1300">
               <a:solidFill>
@@ -5413,14 +5377,14 @@
               <a:buChar char="•"/>
             </a:pPr>
             <a:r>
-              <a:rPr lang="fi-FI" sz="900" err="1" smtClean="0">
+              <a:rPr lang="fi-FI" sz="900" err="1">
                 <a:solidFill>
                   <a:schemeClr val="tx1"/>
                 </a:solidFill>
               </a:rPr>
               <a:t>categoryList</a:t>
             </a:r>
-            <a:endParaRPr lang="fi-FI" sz="900" smtClean="0">
+            <a:endParaRPr lang="fi-FI" sz="900">
               <a:solidFill>
                 <a:schemeClr val="tx1"/>
               </a:solidFill>
@@ -5432,14 +5396,14 @@
               <a:buChar char="•"/>
             </a:pPr>
             <a:r>
-              <a:rPr lang="fi-FI" sz="900" err="1" smtClean="0">
+              <a:rPr lang="fi-FI" sz="900" err="1">
                 <a:solidFill>
                   <a:schemeClr val="tx1"/>
                 </a:solidFill>
               </a:rPr>
               <a:t>categoryCurrent</a:t>
             </a:r>
-            <a:endParaRPr lang="fi-FI" sz="900" smtClean="0">
+            <a:endParaRPr lang="fi-FI" sz="900">
               <a:solidFill>
                 <a:schemeClr val="tx1"/>
               </a:solidFill>
@@ -5451,7 +5415,7 @@
               <a:buChar char="•"/>
             </a:pPr>
             <a:r>
-              <a:rPr lang="fi-FI" sz="900" err="1" smtClean="0">
+              <a:rPr lang="fi-FI" sz="900" err="1">
                 <a:solidFill>
                   <a:schemeClr val="tx1"/>
                 </a:solidFill>
@@ -5459,7 +5423,7 @@
               <a:t>isLoading</a:t>
             </a:r>
             <a:r>
-              <a:rPr lang="fi-FI" sz="900" smtClean="0">
+              <a:rPr lang="fi-FI" sz="900">
                 <a:solidFill>
                   <a:schemeClr val="tx1"/>
                 </a:solidFill>
@@ -5639,15 +5603,7 @@
                   <a:schemeClr val="tx1"/>
                 </a:solidFill>
               </a:rPr>
-              <a:t>m</a:t>
-            </a:r>
-            <a:r>
-              <a:rPr lang="fi-FI" sz="1100" err="1" smtClean="0">
-                <a:solidFill>
-                  <a:schemeClr val="tx1"/>
-                </a:solidFill>
-              </a:rPr>
-              <a:t>apStateToProps</a:t>
+              <a:t>mapStateToProps</a:t>
             </a:r>
             <a:endParaRPr lang="en-US" sz="1100">
               <a:solidFill>
@@ -5755,44 +5711,36 @@
                   <a:schemeClr val="tx1"/>
                 </a:solidFill>
               </a:rPr>
-              <a:t>Old version </a:t>
-            </a:r>
-            <a:r>
-              <a:rPr lang="fi-FI" sz="800" smtClean="0">
+              <a:t>Old version of</a:t>
+            </a:r>
+          </a:p>
+          <a:p>
+            <a:pPr algn="ctr"/>
+            <a:r>
+              <a:rPr lang="fi-FI" sz="800" err="1">
                 <a:solidFill>
                   <a:schemeClr val="tx1"/>
                 </a:solidFill>
               </a:rPr>
-              <a:t>of</a:t>
-            </a:r>
-          </a:p>
-          <a:p>
-            <a:pPr algn="ctr"/>
-            <a:r>
-              <a:rPr lang="fi-FI" sz="800" err="1" smtClean="0">
+              <a:t>the</a:t>
+            </a:r>
+            <a:r>
+              <a:rPr lang="fi-FI" sz="800">
                 <a:solidFill>
                   <a:schemeClr val="tx1"/>
                 </a:solidFill>
               </a:rPr>
-              <a:t>the</a:t>
-            </a:r>
-            <a:r>
-              <a:rPr lang="fi-FI" sz="800" smtClean="0">
+              <a:t> </a:t>
+            </a:r>
+            <a:r>
+              <a:rPr lang="fi-FI" sz="800" err="1">
                 <a:solidFill>
                   <a:schemeClr val="tx1"/>
                 </a:solidFill>
               </a:rPr>
-              <a:t> </a:t>
-            </a:r>
-            <a:r>
-              <a:rPr lang="fi-FI" sz="800" err="1" smtClean="0">
-                <a:solidFill>
-                  <a:schemeClr val="tx1"/>
-                </a:solidFill>
-              </a:rPr>
               <a:t>store</a:t>
             </a:r>
-            <a:endParaRPr lang="fi-FI" sz="800" smtClean="0">
+            <a:endParaRPr lang="fi-FI" sz="800">
               <a:solidFill>
                 <a:schemeClr val="tx1"/>
               </a:solidFill>
@@ -5801,7 +5749,7 @@
           <a:p>
             <a:pPr algn="ctr"/>
             <a:r>
-              <a:rPr lang="fi-FI" sz="800" err="1" smtClean="0">
+              <a:rPr lang="fi-FI" sz="800" err="1">
                 <a:solidFill>
                   <a:schemeClr val="tx1"/>
                 </a:solidFill>
@@ -5915,14 +5863,54 @@
           <a:p>
             <a:pPr algn="ctr"/>
             <a:r>
-              <a:rPr lang="fi-FI" sz="1000" smtClean="0">
+              <a:rPr lang="fi-FI" sz="1000" dirty="0">
                 <a:solidFill>
                   <a:schemeClr val="tx1"/>
                 </a:solidFill>
               </a:rPr>
-              <a:t>Action dispatched to redux store</a:t>
-            </a:r>
-            <a:endParaRPr lang="en-US" sz="1000">
+              <a:t>Action </a:t>
+            </a:r>
+            <a:r>
+              <a:rPr lang="fi-FI" sz="1000" dirty="0" err="1">
+                <a:solidFill>
+                  <a:schemeClr val="tx1"/>
+                </a:solidFill>
+              </a:rPr>
+              <a:t>dispatched</a:t>
+            </a:r>
+            <a:r>
+              <a:rPr lang="fi-FI" sz="1000" dirty="0">
+                <a:solidFill>
+                  <a:schemeClr val="tx1"/>
+                </a:solidFill>
+              </a:rPr>
+              <a:t> to </a:t>
+            </a:r>
+            <a:r>
+              <a:rPr lang="fi-FI" sz="1000" dirty="0" err="1">
+                <a:solidFill>
+                  <a:schemeClr val="tx1"/>
+                </a:solidFill>
+              </a:rPr>
+              <a:t>redux</a:t>
+            </a:r>
+            <a:r>
+              <a:rPr lang="fi-FI" sz="1000" dirty="0">
+                <a:solidFill>
+                  <a:schemeClr val="tx1"/>
+                </a:solidFill>
+              </a:rPr>
+              <a:t> </a:t>
+            </a:r>
+            <a:r>
+              <a:rPr lang="fi-FI" sz="1000" dirty="0" err="1">
+                <a:solidFill>
+                  <a:schemeClr val="tx1"/>
+                </a:solidFill>
+              </a:rPr>
+              <a:t>store</a:t>
+            </a:r>
+            <a:endParaRPr lang="en-US" sz="1000" dirty="0">
               <a:solidFill>
                 <a:schemeClr val="tx1"/>
               </a:solidFill>
@@ -5977,7 +5965,7 @@
           <a:p>
             <a:pPr algn="ctr"/>
             <a:r>
-              <a:rPr lang="fi-FI" sz="1100" smtClean="0">
+              <a:rPr lang="fi-FI" sz="1100">
                 <a:solidFill>
                   <a:schemeClr val="tx1"/>
                 </a:solidFill>
@@ -5985,7 +5973,7 @@
               <a:t>”</a:t>
             </a:r>
             <a:r>
-              <a:rPr lang="fi-FI" sz="1100" err="1" smtClean="0">
+              <a:rPr lang="fi-FI" sz="1100" err="1">
                 <a:solidFill>
                   <a:schemeClr val="tx1"/>
                 </a:solidFill>
@@ -5993,31 +5981,23 @@
               <a:t>Front</a:t>
             </a:r>
             <a:r>
-              <a:rPr lang="fi-FI" sz="1100" smtClean="0">
+              <a:rPr lang="fi-FI" sz="1100">
                 <a:solidFill>
                   <a:schemeClr val="tx1"/>
                 </a:solidFill>
               </a:rPr>
-              <a:t> </a:t>
+              <a:t> end side temporary data </a:t>
+            </a:r>
+            <a:r>
+              <a:rPr lang="fi-FI" sz="1100" err="1">
+                <a:solidFill>
+                  <a:schemeClr val="tx1"/>
+                </a:solidFill>
+              </a:rPr>
+              <a:t>model</a:t>
             </a:r>
             <a:r>
               <a:rPr lang="fi-FI" sz="1100">
-                <a:solidFill>
-                  <a:schemeClr val="tx1"/>
-                </a:solidFill>
-              </a:rPr>
-              <a:t>end side temporary data </a:t>
-            </a:r>
-            <a:r>
-              <a:rPr lang="fi-FI" sz="1100" err="1" smtClean="0">
-                <a:solidFill>
-                  <a:schemeClr val="tx1"/>
-                </a:solidFill>
-              </a:rPr>
-              <a:t>model</a:t>
-            </a:r>
-            <a:r>
-              <a:rPr lang="fi-FI" sz="1100" smtClean="0">
                 <a:solidFill>
                   <a:schemeClr val="tx1"/>
                 </a:solidFill>
@@ -6127,23 +6107,7 @@
                   <a:schemeClr val="tx1"/>
                 </a:solidFill>
               </a:rPr>
-              <a:t>n</a:t>
-            </a:r>
-            <a:r>
-              <a:rPr lang="fi-FI" sz="1000" smtClean="0">
-                <a:solidFill>
-                  <a:schemeClr val="tx1"/>
-                </a:solidFill>
-              </a:rPr>
-              <a:t>ew </a:t>
-            </a:r>
-            <a:r>
-              <a:rPr lang="fi-FI" sz="1000">
-                <a:solidFill>
-                  <a:schemeClr val="tx1"/>
-                </a:solidFill>
-              </a:rPr>
-              <a:t>state</a:t>
+              <a:t>new state</a:t>
             </a:r>
             <a:endParaRPr lang="en-US" sz="1000">
               <a:solidFill>
@@ -6400,7 +6364,7 @@
           <a:p>
             <a:pPr algn="ctr"/>
             <a:r>
-              <a:rPr lang="fi-FI" sz="1300" smtClean="0">
+              <a:rPr lang="fi-FI" sz="1300">
                 <a:solidFill>
                   <a:schemeClr val="tx1"/>
                 </a:solidFill>
@@ -6528,7 +6492,7 @@
           <a:p>
             <a:pPr algn="r"/>
             <a:r>
-              <a:rPr lang="en-US" sz="1100" smtClean="0">
+              <a:rPr lang="en-US" sz="1100">
                 <a:solidFill>
                   <a:schemeClr val="tx1"/>
                 </a:solidFill>
@@ -6536,14 +6500,14 @@
               <a:t>(Node)</a:t>
             </a:r>
             <a:br>
-              <a:rPr lang="en-US" sz="1100" smtClean="0">
+              <a:rPr lang="en-US" sz="1100">
                 <a:solidFill>
                   <a:schemeClr val="tx1"/>
                 </a:solidFill>
               </a:rPr>
             </a:br>
             <a:r>
-              <a:rPr lang="en-US" sz="1100" smtClean="0">
+              <a:rPr lang="en-US" sz="1100">
                 <a:solidFill>
                   <a:schemeClr val="tx1"/>
                 </a:solidFill>
@@ -6551,60 +6515,44 @@
               <a:t>Express</a:t>
             </a:r>
             <a:br>
-              <a:rPr lang="en-US" sz="1100" smtClean="0">
+              <a:rPr lang="en-US" sz="1100">
                 <a:solidFill>
                   <a:schemeClr val="tx1"/>
                 </a:solidFill>
               </a:rPr>
             </a:br>
             <a:r>
-              <a:rPr lang="en-US" sz="1100" strike="sngStrike" smtClean="0">
+              <a:rPr lang="en-US" sz="1100" strike="sngStrike">
                 <a:solidFill>
                   <a:schemeClr val="tx1"/>
                 </a:solidFill>
               </a:rPr>
               <a:t>Joi</a:t>
             </a:r>
-            <a:r>
-              <a:rPr lang="en-US" sz="1100" smtClean="0">
+            <a:br>
+              <a:rPr lang="en-US" sz="1100">
                 <a:solidFill>
                   <a:schemeClr val="tx1"/>
                 </a:solidFill>
               </a:rPr>
-              <a:t/>
+            </a:br>
+            <a:r>
+              <a:rPr lang="en-US" sz="1100" err="1">
+                <a:solidFill>
+                  <a:schemeClr val="tx1"/>
+                </a:solidFill>
+              </a:rPr>
+              <a:t>Knex</a:t>
             </a:r>
             <a:br>
-              <a:rPr lang="en-US" sz="1100" smtClean="0">
+              <a:rPr lang="en-US" sz="1100">
                 <a:solidFill>
                   <a:schemeClr val="tx1"/>
                 </a:solidFill>
               </a:rPr>
             </a:br>
             <a:r>
-              <a:rPr lang="en-US" sz="1100" err="1" smtClean="0">
-                <a:solidFill>
-                  <a:schemeClr val="tx1"/>
-                </a:solidFill>
-              </a:rPr>
-              <a:t>Knex</a:t>
-            </a:r>
-            <a:r>
-              <a:rPr lang="en-US" sz="1100" smtClean="0">
-                <a:solidFill>
-                  <a:schemeClr val="tx1"/>
-                </a:solidFill>
-              </a:rPr>
-              <a:t/>
-            </a:r>
-            <a:br>
-              <a:rPr lang="en-US" sz="1100" smtClean="0">
-                <a:solidFill>
-                  <a:schemeClr val="tx1"/>
-                </a:solidFill>
-              </a:rPr>
-            </a:br>
-            <a:r>
-              <a:rPr lang="en-US" sz="1100" err="1" smtClean="0">
+              <a:rPr lang="en-US" sz="1100" err="1">
                 <a:solidFill>
                   <a:schemeClr val="tx1"/>
                 </a:solidFill>
@@ -6941,7 +6889,7 @@
           <a:p>
             <a:pPr algn="ctr"/>
             <a:r>
-              <a:rPr lang="fi-FI" sz="1000" err="1">
+              <a:rPr lang="fi-FI" sz="1000" dirty="0" err="1">
                 <a:solidFill>
                   <a:schemeClr val="tx1"/>
                 </a:solidFill>
@@ -6949,7 +6897,7 @@
               <a:t>Async</a:t>
             </a:r>
             <a:r>
-              <a:rPr lang="fi-FI" sz="1000">
+              <a:rPr lang="fi-FI" sz="1000" dirty="0">
                 <a:solidFill>
                   <a:schemeClr val="tx1"/>
                 </a:solidFill>
@@ -6957,7 +6905,7 @@
               <a:t> </a:t>
             </a:r>
             <a:r>
-              <a:rPr lang="fi-FI" sz="1000" err="1" smtClean="0">
+              <a:rPr lang="fi-FI" sz="1000" dirty="0" err="1">
                 <a:solidFill>
                   <a:schemeClr val="tx1"/>
                 </a:solidFill>
@@ -6965,14 +6913,38 @@
               <a:t>call</a:t>
             </a:r>
             <a:r>
-              <a:rPr lang="fi-FI" sz="1000">
+              <a:rPr lang="fi-FI" sz="1000" dirty="0">
                 <a:solidFill>
                   <a:schemeClr val="tx1"/>
                 </a:solidFill>
               </a:rPr>
-              <a:t>, then await</a:t>
-            </a:r>
-            <a:endParaRPr lang="en-US" sz="1000">
+              <a:t>, </a:t>
+            </a:r>
+            <a:r>
+              <a:rPr lang="fi-FI" sz="1000" dirty="0" err="1">
+                <a:solidFill>
+                  <a:schemeClr val="tx1"/>
+                </a:solidFill>
+              </a:rPr>
+              <a:t>then</a:t>
+            </a:r>
+            <a:r>
+              <a:rPr lang="fi-FI" sz="1000" dirty="0">
+                <a:solidFill>
+                  <a:schemeClr val="tx1"/>
+                </a:solidFill>
+              </a:rPr>
+              <a:t> </a:t>
+            </a:r>
+            <a:r>
+              <a:rPr lang="fi-FI" sz="1000" dirty="0" err="1">
+                <a:solidFill>
+                  <a:schemeClr val="tx1"/>
+                </a:solidFill>
+              </a:rPr>
+              <a:t>await</a:t>
+            </a:r>
+            <a:endParaRPr lang="en-US" sz="1000" dirty="0">
               <a:solidFill>
                 <a:schemeClr val="tx1"/>
               </a:solidFill>
@@ -6994,7 +6966,7 @@
         </p:nvSpPr>
         <p:spPr>
           <a:xfrm>
-            <a:off x="10693587" y="2674131"/>
+            <a:off x="10703596" y="2670567"/>
             <a:ext cx="1178559" cy="403454"/>
           </a:xfrm>
           <a:prstGeom prst="rect">
@@ -7031,14 +7003,14 @@
           <a:p>
             <a:pPr algn="ctr"/>
             <a:r>
-              <a:rPr lang="fi-FI" sz="1500">
+              <a:rPr lang="fi-FI" sz="1500" dirty="0">
                 <a:solidFill>
                   <a:schemeClr val="tx1"/>
                 </a:solidFill>
               </a:rPr>
               <a:t>DBMS</a:t>
             </a:r>
-            <a:endParaRPr lang="en-US" sz="1500">
+            <a:endParaRPr lang="en-US" sz="1500" dirty="0">
               <a:solidFill>
                 <a:schemeClr val="tx1"/>
               </a:solidFill>
@@ -7056,14 +7028,16 @@
             </a:extLst>
           </p:cNvPr>
           <p:cNvCxnSpPr>
+            <a:cxnSpLocks/>
             <a:stCxn id="117" idx="2"/>
+            <a:endCxn id="129" idx="0"/>
           </p:cNvCxnSpPr>
           <p:nvPr/>
         </p:nvCxnSpPr>
         <p:spPr>
-          <a:xfrm rot="16200000" flipH="1">
-            <a:off x="11000951" y="2377789"/>
-            <a:ext cx="590279" cy="3659"/>
+          <a:xfrm rot="5400000">
+            <a:off x="11000526" y="2376831"/>
+            <a:ext cx="586087" cy="1385"/>
           </a:xfrm>
           <a:prstGeom prst="bentConnector3">
             <a:avLst/>
@@ -7146,8 +7120,8 @@
         </p:nvSpPr>
         <p:spPr>
           <a:xfrm>
-            <a:off x="10755421" y="3241436"/>
-            <a:ext cx="1094930" cy="754738"/>
+            <a:off x="10771937" y="3241436"/>
+            <a:ext cx="1078414" cy="754738"/>
           </a:xfrm>
           <a:prstGeom prst="can">
             <a:avLst/>
@@ -7260,8 +7234,8 @@
         </p:nvCxnSpPr>
         <p:spPr>
           <a:xfrm>
-            <a:off x="11282867" y="3077585"/>
-            <a:ext cx="10009" cy="208990"/>
+            <a:off x="11292876" y="3074021"/>
+            <a:ext cx="0" cy="212554"/>
           </a:xfrm>
           <a:prstGeom prst="line">
             <a:avLst/>
@@ -7849,7 +7823,7 @@
           <a:p>
             <a:pPr algn="ctr"/>
             <a:r>
-              <a:rPr lang="fi-FI" sz="1100" err="1" smtClean="0">
+              <a:rPr lang="fi-FI" sz="1100" err="1">
                 <a:solidFill>
                   <a:schemeClr val="tx1"/>
                 </a:solidFill>
@@ -7886,7 +7860,7 @@
           <a:lstStyle/>
           <a:p>
             <a:r>
-              <a:rPr lang="fi-FI" err="1" smtClean="0"/>
+              <a:rPr lang="fi-FI" err="1"/>
               <a:t>CategoryRandomized</a:t>
             </a:r>
             <a:endParaRPr lang="fi-FI"/>
@@ -7957,15 +7931,15 @@
           <a:lstStyle/>
           <a:p>
             <a:r>
-              <a:rPr lang="fi-FI" sz="1100" strike="sngStrike" err="1" smtClean="0"/>
+              <a:rPr lang="fi-FI" sz="1100" strike="sngStrike" err="1"/>
               <a:t>React</a:t>
             </a:r>
             <a:r>
-              <a:rPr lang="fi-FI" sz="1100" strike="sngStrike" smtClean="0"/>
+              <a:rPr lang="fi-FI" sz="1100" strike="sngStrike"/>
               <a:t> </a:t>
             </a:r>
             <a:r>
-              <a:rPr lang="fi-FI" sz="1100" strike="sngStrike" err="1" smtClean="0"/>
+              <a:rPr lang="fi-FI" sz="1100" strike="sngStrike" err="1"/>
               <a:t>state</a:t>
             </a:r>
             <a:endParaRPr lang="fi-FI" sz="1100" strike="sngStrike"/>
@@ -7994,28 +7968,28 @@
           <a:lstStyle/>
           <a:p>
             <a:r>
-              <a:rPr lang="fi-FI" sz="1100" err="1" smtClean="0"/>
+              <a:rPr lang="fi-FI" sz="1100" err="1"/>
               <a:t>React</a:t>
             </a:r>
             <a:r>
-              <a:rPr lang="fi-FI" sz="1100" smtClean="0"/>
+              <a:rPr lang="fi-FI" sz="1100"/>
               <a:t> </a:t>
             </a:r>
             <a:r>
-              <a:rPr lang="fi-FI" sz="1100" err="1" smtClean="0"/>
+              <a:rPr lang="fi-FI" sz="1100" err="1"/>
               <a:t>props</a:t>
             </a:r>
             <a:r>
-              <a:rPr lang="fi-FI" sz="1100" smtClean="0"/>
+              <a:rPr lang="fi-FI" sz="1100"/>
               <a:t>,</a:t>
             </a:r>
           </a:p>
           <a:p>
             <a:r>
-              <a:rPr lang="fi-FI" sz="1100" err="1" smtClean="0"/>
+              <a:rPr lang="fi-FI" sz="1100" err="1"/>
               <a:t>deleteCategoryLocal</a:t>
             </a:r>
-            <a:endParaRPr lang="fi-FI" sz="1100" smtClean="0"/>
+            <a:endParaRPr lang="fi-FI" sz="1100"/>
           </a:p>
         </p:txBody>
       </p:sp>
@@ -8041,7 +8015,7 @@
           <a:lstStyle/>
           <a:p>
             <a:r>
-              <a:rPr lang="fi-FI" sz="1100" err="1" smtClean="0"/>
+              <a:rPr lang="fi-FI" sz="1100" err="1"/>
               <a:t>props</a:t>
             </a:r>
             <a:endParaRPr lang="fi-FI" sz="1100"/>
@@ -8111,7 +8085,7 @@
             <a:p>
               <a:pPr algn="ctr"/>
               <a:r>
-                <a:rPr lang="fi-FI" err="1" smtClean="0">
+                <a:rPr lang="fi-FI" err="1">
                   <a:solidFill>
                     <a:schemeClr val="tx1"/>
                   </a:solidFill>
@@ -8148,7 +8122,7 @@
             <a:lstStyle/>
             <a:p>
               <a:r>
-                <a:rPr lang="fi-FI" sz="1100" err="1" smtClean="0"/>
+                <a:rPr lang="fi-FI" sz="1100" err="1"/>
                 <a:t>props</a:t>
               </a:r>
               <a:endParaRPr lang="fi-FI" sz="1100"/>
@@ -8218,7 +8192,7 @@
             <a:lstStyle/>
             <a:p>
               <a:r>
-                <a:rPr lang="fi-FI" err="1" smtClean="0">
+                <a:rPr lang="fi-FI" err="1">
                   <a:solidFill>
                     <a:schemeClr val="tx1"/>
                   </a:solidFill>
@@ -8255,7 +8229,7 @@
             <a:lstStyle/>
             <a:p>
               <a:r>
-                <a:rPr lang="fi-FI" sz="1100" err="1" smtClean="0"/>
+                <a:rPr lang="fi-FI" sz="1100" err="1"/>
                 <a:t>props</a:t>
               </a:r>
               <a:endParaRPr lang="fi-FI" sz="1100"/>
@@ -8311,7 +8285,7 @@
           <a:lstStyle/>
           <a:p>
             <a:r>
-              <a:rPr lang="fi-FI" err="1" smtClean="0">
+              <a:rPr lang="fi-FI" err="1">
                 <a:solidFill>
                   <a:schemeClr val="tx1"/>
                 </a:solidFill>
@@ -8319,7 +8293,7 @@
               <a:t>CategoryItem</a:t>
             </a:r>
             <a:r>
-              <a:rPr lang="fi-FI" smtClean="0">
+              <a:rPr lang="fi-FI">
                 <a:solidFill>
                   <a:schemeClr val="tx1"/>
                 </a:solidFill>
@@ -8356,7 +8330,7 @@
           <a:lstStyle/>
           <a:p>
             <a:r>
-              <a:rPr lang="fi-FI" sz="1100" err="1" smtClean="0"/>
+              <a:rPr lang="fi-FI" sz="1100" err="1"/>
               <a:t>props</a:t>
             </a:r>
             <a:endParaRPr lang="fi-FI" sz="1100"/>
@@ -8385,7 +8359,7 @@
           <a:lstStyle/>
           <a:p>
             <a:r>
-              <a:rPr lang="fi-FI" sz="1100" err="1" smtClean="0"/>
+              <a:rPr lang="fi-FI" sz="1100" err="1"/>
               <a:t>props</a:t>
             </a:r>
             <a:endParaRPr lang="fi-FI" sz="1100"/>
@@ -8421,7 +8395,7 @@
           <a:lstStyle/>
           <a:p>
             <a:r>
-              <a:rPr lang="fi-FI" err="1" smtClean="0"/>
+              <a:rPr lang="fi-FI" err="1"/>
               <a:t>CategoryListItem</a:t>
             </a:r>
             <a:endParaRPr lang="en-US"/>
@@ -8546,7 +8520,7 @@
             <a:lstStyle/>
             <a:p>
               <a:r>
-                <a:rPr lang="fi-FI" err="1" smtClean="0">
+                <a:rPr lang="fi-FI" err="1">
                   <a:solidFill>
                     <a:schemeClr val="tx1"/>
                   </a:solidFill>
@@ -8583,7 +8557,7 @@
             <a:lstStyle/>
             <a:p>
               <a:r>
-                <a:rPr lang="fi-FI" sz="1100" err="1" smtClean="0"/>
+                <a:rPr lang="fi-FI" sz="1100" err="1"/>
                 <a:t>props</a:t>
               </a:r>
               <a:endParaRPr lang="fi-FI" sz="1100"/>
@@ -8613,7 +8587,7 @@
           <a:lstStyle/>
           <a:p>
             <a:r>
-              <a:rPr lang="fi-FI" sz="1100" err="1" smtClean="0"/>
+              <a:rPr lang="fi-FI" sz="1100" err="1"/>
               <a:t>props</a:t>
             </a:r>
             <a:endParaRPr lang="fi-FI" sz="1100"/>
@@ -8649,7 +8623,7 @@
           <a:lstStyle/>
           <a:p>
             <a:r>
-              <a:rPr lang="fi-FI" err="1" smtClean="0"/>
+              <a:rPr lang="fi-FI" err="1"/>
               <a:t>CategoryListItem</a:t>
             </a:r>
             <a:endParaRPr lang="en-US"/>
@@ -8894,15 +8868,7 @@
                   <a:schemeClr val="tx1"/>
                 </a:solidFill>
               </a:rPr>
-              <a:t>m</a:t>
-            </a:r>
-            <a:r>
-              <a:rPr lang="fi-FI" sz="1100" err="1" smtClean="0">
-                <a:solidFill>
-                  <a:schemeClr val="tx1"/>
-                </a:solidFill>
-              </a:rPr>
-              <a:t>apStateToProps</a:t>
+              <a:t>mapStateToProps</a:t>
             </a:r>
             <a:endParaRPr lang="en-US" sz="1100">
               <a:solidFill>
@@ -8934,77 +8900,77 @@
           <a:lstStyle/>
           <a:p>
             <a:r>
-              <a:rPr lang="fi-FI" smtClean="0"/>
+              <a:rPr lang="fi-FI"/>
               <a:t>Next </a:t>
             </a:r>
             <a:r>
-              <a:rPr lang="fi-FI" err="1" smtClean="0"/>
+              <a:rPr lang="fi-FI" err="1"/>
               <a:t>task</a:t>
             </a:r>
             <a:r>
-              <a:rPr lang="fi-FI" smtClean="0"/>
+              <a:rPr lang="fi-FI"/>
               <a:t>: </a:t>
             </a:r>
             <a:r>
-              <a:rPr lang="fi-FI" err="1" smtClean="0"/>
+              <a:rPr lang="fi-FI" err="1"/>
               <a:t>Use</a:t>
             </a:r>
             <a:r>
-              <a:rPr lang="fi-FI" smtClean="0"/>
+              <a:rPr lang="fi-FI"/>
               <a:t> </a:t>
             </a:r>
             <a:r>
-              <a:rPr lang="fi-FI" err="1" smtClean="0"/>
+              <a:rPr lang="fi-FI" err="1"/>
               <a:t>same</a:t>
             </a:r>
             <a:r>
-              <a:rPr lang="fi-FI" smtClean="0"/>
+              <a:rPr lang="fi-FI"/>
               <a:t> </a:t>
             </a:r>
             <a:r>
-              <a:rPr lang="fi-FI" err="1" smtClean="0"/>
+              <a:rPr lang="fi-FI" err="1"/>
               <a:t>programming</a:t>
             </a:r>
             <a:r>
-              <a:rPr lang="fi-FI" smtClean="0"/>
+              <a:rPr lang="fi-FI"/>
               <a:t> </a:t>
             </a:r>
             <a:r>
-              <a:rPr lang="fi-FI" err="1" smtClean="0"/>
+              <a:rPr lang="fi-FI" err="1"/>
               <a:t>model</a:t>
             </a:r>
             <a:r>
-              <a:rPr lang="fi-FI" smtClean="0"/>
+              <a:rPr lang="fi-FI"/>
               <a:t> and</a:t>
             </a:r>
           </a:p>
           <a:p>
             <a:r>
-              <a:rPr lang="fi-FI" err="1" smtClean="0"/>
+              <a:rPr lang="fi-FI" err="1"/>
               <a:t>Add</a:t>
             </a:r>
             <a:r>
-              <a:rPr lang="fi-FI" smtClean="0"/>
+              <a:rPr lang="fi-FI"/>
               <a:t> </a:t>
             </a:r>
             <a:r>
-              <a:rPr lang="fi-FI" err="1" smtClean="0"/>
+              <a:rPr lang="fi-FI" err="1"/>
               <a:t>delete</a:t>
             </a:r>
             <a:r>
-              <a:rPr lang="fi-FI" smtClean="0"/>
+              <a:rPr lang="fi-FI"/>
               <a:t> </a:t>
             </a:r>
             <a:r>
-              <a:rPr lang="fi-FI" err="1" smtClean="0"/>
+              <a:rPr lang="fi-FI" err="1"/>
               <a:t>button</a:t>
             </a:r>
             <a:r>
-              <a:rPr lang="fi-FI" smtClean="0"/>
+              <a:rPr lang="fi-FI"/>
               <a:t> to </a:t>
             </a:r>
             <a:r>
-              <a:rPr lang="fi-FI" err="1" smtClean="0"/>
+              <a:rPr lang="fi-FI" err="1"/>
               <a:t>CategoryListItem</a:t>
             </a:r>
             <a:endParaRPr lang="fi-FI"/>
@@ -9060,18 +9026,13 @@
           <a:p>
             <a:pPr algn="ctr"/>
             <a:r>
-              <a:rPr lang="en-US" sz="1200" smtClean="0">
+              <a:rPr lang="en-US" sz="1200">
                 <a:solidFill>
                   <a:sysClr val="windowText" lastClr="000000"/>
                 </a:solidFill>
               </a:rPr>
               <a:t>x</a:t>
             </a:r>
-            <a:endParaRPr lang="en-US" sz="1200">
-              <a:solidFill>
-                <a:sysClr val="windowText" lastClr="000000"/>
-              </a:solidFill>
-            </a:endParaRPr>
           </a:p>
         </p:txBody>
       </p:sp>
@@ -9124,18 +9085,13 @@
           <a:p>
             <a:pPr algn="ctr"/>
             <a:r>
-              <a:rPr lang="en-US" sz="1200" smtClean="0">
+              <a:rPr lang="en-US" sz="1200">
                 <a:solidFill>
                   <a:sysClr val="windowText" lastClr="000000"/>
                 </a:solidFill>
               </a:rPr>
               <a:t>x</a:t>
             </a:r>
-            <a:endParaRPr lang="en-US" sz="1200">
-              <a:solidFill>
-                <a:sysClr val="windowText" lastClr="000000"/>
-              </a:solidFill>
-            </a:endParaRPr>
           </a:p>
         </p:txBody>
       </p:sp>
@@ -9188,18 +9144,13 @@
           <a:p>
             <a:pPr algn="ctr"/>
             <a:r>
-              <a:rPr lang="en-US" sz="1200" smtClean="0">
+              <a:rPr lang="en-US" sz="1200">
                 <a:solidFill>
                   <a:sysClr val="windowText" lastClr="000000"/>
                 </a:solidFill>
               </a:rPr>
               <a:t>x</a:t>
             </a:r>
-            <a:endParaRPr lang="en-US" sz="1200">
-              <a:solidFill>
-                <a:sysClr val="windowText" lastClr="000000"/>
-              </a:solidFill>
-            </a:endParaRPr>
           </a:p>
         </p:txBody>
       </p:sp>
@@ -9296,7 +9247,7 @@
           <a:p>
             <a:pPr algn="ctr"/>
             <a:r>
-              <a:rPr lang="fi-FI" sz="1100" err="1" smtClean="0">
+              <a:rPr lang="fi-FI" sz="1100" err="1">
                 <a:solidFill>
                   <a:schemeClr val="tx1"/>
                 </a:solidFill>
@@ -9338,15 +9289,15 @@
           <a:lstStyle/>
           <a:p>
             <a:r>
-              <a:rPr lang="fi-FI" sz="1100" err="1" smtClean="0"/>
+              <a:rPr lang="fi-FI" sz="1100" err="1"/>
               <a:t>React</a:t>
             </a:r>
             <a:r>
-              <a:rPr lang="fi-FI" sz="1100" smtClean="0"/>
+              <a:rPr lang="fi-FI" sz="1100"/>
               <a:t> </a:t>
             </a:r>
             <a:r>
-              <a:rPr lang="fi-FI" sz="1100" err="1" smtClean="0"/>
+              <a:rPr lang="fi-FI" sz="1100" err="1"/>
               <a:t>state</a:t>
             </a:r>
             <a:endParaRPr lang="fi-FI" sz="1100"/>
@@ -9633,7 +9584,7 @@
           <a:lstStyle/>
           <a:p>
             <a:r>
-              <a:rPr lang="en-US" sz="1500" smtClean="0"/>
+              <a:rPr lang="en-US" sz="1500"/>
               <a:t>mariadb.haaga-helia.fi</a:t>
             </a:r>
             <a:endParaRPr lang="fi-FI" sz="1500"/>
@@ -9662,7 +9613,7 @@
           <a:lstStyle/>
           <a:p>
             <a:r>
-              <a:rPr lang="fi-FI" sz="1100" smtClean="0"/>
+              <a:rPr lang="fi-FI" sz="1100"/>
               <a:t>© 2019 Juhani Välimäki</a:t>
             </a:r>
             <a:endParaRPr lang="en-US" sz="1100"/>
@@ -9728,7 +9679,7 @@
               <a:t>Action </a:t>
             </a:r>
             <a:r>
-              <a:rPr lang="fi-FI" sz="1300" err="1" smtClean="0">
+              <a:rPr lang="fi-FI" sz="1300" err="1">
                 <a:solidFill>
                   <a:schemeClr val="tx1"/>
                 </a:solidFill>
@@ -9736,7 +9687,7 @@
               <a:t>handler</a:t>
             </a:r>
             <a:r>
-              <a:rPr lang="fi-FI" sz="1300" smtClean="0">
+              <a:rPr lang="fi-FI" sz="1300">
                 <a:solidFill>
                   <a:schemeClr val="tx1"/>
                 </a:solidFill>
@@ -9744,7 +9695,7 @@
               <a:t>, </a:t>
             </a:r>
             <a:r>
-              <a:rPr lang="fi-FI" sz="1300" err="1" smtClean="0">
+              <a:rPr lang="fi-FI" sz="1300" err="1">
                 <a:solidFill>
                   <a:schemeClr val="tx1"/>
                 </a:solidFill>
@@ -9752,7 +9703,7 @@
               <a:t>dispatching</a:t>
             </a:r>
             <a:r>
-              <a:rPr lang="fi-FI" sz="1300" smtClean="0">
+              <a:rPr lang="fi-FI" sz="1300">
                 <a:solidFill>
                   <a:schemeClr val="tx1"/>
                 </a:solidFill>
@@ -9760,7 +9711,7 @@
               <a:t> Action </a:t>
             </a:r>
             <a:r>
-              <a:rPr lang="fi-FI" sz="1300" err="1" smtClean="0">
+              <a:rPr lang="fi-FI" sz="1300" err="1">
                 <a:solidFill>
                   <a:schemeClr val="tx1"/>
                 </a:solidFill>
@@ -9903,7 +9854,7 @@
           <a:p>
             <a:pPr algn="ctr"/>
             <a:r>
-              <a:rPr lang="fi-FI" err="1" smtClean="0">
+              <a:rPr lang="fi-FI" err="1">
                 <a:solidFill>
                   <a:schemeClr val="bg1">
                     <a:lumMod val="50000"/>
@@ -10009,7 +9960,7 @@
           <a:p>
             <a:pPr algn="ctr"/>
             <a:r>
-              <a:rPr lang="fi-FI" sz="1100" err="1" smtClean="0">
+              <a:rPr lang="fi-FI" sz="1100" err="1">
                 <a:solidFill>
                   <a:schemeClr val="bg1">
                     <a:lumMod val="50000"/>
@@ -10019,7 +9970,7 @@
               <a:t>Store</a:t>
             </a:r>
             <a:r>
-              <a:rPr lang="fi-FI" sz="1100" smtClean="0">
+              <a:rPr lang="fi-FI" sz="1100">
                 <a:solidFill>
                   <a:schemeClr val="bg1">
                     <a:lumMod val="50000"/>
@@ -10029,7 +9980,7 @@
               <a:t> </a:t>
             </a:r>
             <a:r>
-              <a:rPr lang="fi-FI" sz="1100" err="1" smtClean="0">
+              <a:rPr lang="fi-FI" sz="1100" err="1">
                 <a:solidFill>
                   <a:schemeClr val="bg1">
                     <a:lumMod val="50000"/>
@@ -10039,7 +9990,7 @@
               <a:t>found</a:t>
             </a:r>
             <a:r>
-              <a:rPr lang="fi-FI" sz="1100" smtClean="0">
+              <a:rPr lang="fi-FI" sz="1100">
                 <a:solidFill>
                   <a:schemeClr val="bg1">
                     <a:lumMod val="50000"/>
@@ -10059,39 +10010,29 @@
                   </a:schemeClr>
                 </a:solidFill>
               </a:rPr>
-              <a:t>r</a:t>
-            </a:r>
-            <a:r>
-              <a:rPr lang="fi-FI" sz="1100" err="1" smtClean="0">
+              <a:t>root</a:t>
+            </a:r>
+            <a:r>
+              <a:rPr lang="fi-FI" sz="1100">
                 <a:solidFill>
                   <a:schemeClr val="bg1">
                     <a:lumMod val="50000"/>
                   </a:schemeClr>
                 </a:solidFill>
               </a:rPr>
-              <a:t>oot</a:t>
-            </a:r>
-            <a:r>
-              <a:rPr lang="fi-FI" sz="1100" smtClean="0">
+              <a:t> </a:t>
+            </a:r>
+            <a:r>
+              <a:rPr lang="fi-FI" sz="1100" err="1">
                 <a:solidFill>
                   <a:schemeClr val="bg1">
                     <a:lumMod val="50000"/>
                   </a:schemeClr>
                 </a:solidFill>
               </a:rPr>
-              <a:t> </a:t>
-            </a:r>
-            <a:r>
-              <a:rPr lang="fi-FI" sz="1100" err="1" smtClean="0">
-                <a:solidFill>
-                  <a:schemeClr val="bg1">
-                    <a:lumMod val="50000"/>
-                  </a:schemeClr>
-                </a:solidFill>
-              </a:rPr>
               <a:t>component</a:t>
             </a:r>
-            <a:endParaRPr lang="fi-FI" sz="1100" smtClean="0">
+            <a:endParaRPr lang="fi-FI" sz="1100">
               <a:solidFill>
                 <a:schemeClr val="bg1">
                   <a:lumMod val="50000"/>
@@ -10112,7 +10053,7 @@
               <a:t>c</a:t>
             </a:r>
             <a:r>
-              <a:rPr lang="fi-FI" sz="1100" smtClean="0">
+              <a:rPr lang="fi-FI" sz="1100">
                 <a:solidFill>
                   <a:schemeClr val="bg1">
                     <a:lumMod val="50000"/>
@@ -10122,7 +10063,7 @@
               <a:t>alled </a:t>
             </a:r>
             <a:r>
-              <a:rPr lang="fi-FI" sz="1100" err="1" smtClean="0">
+              <a:rPr lang="fi-FI" sz="1100" err="1">
                 <a:solidFill>
                   <a:schemeClr val="bg1">
                     <a:lumMod val="50000"/>
@@ -10168,10 +10109,9 @@
           <a:lstStyle/>
           <a:p>
             <a:r>
-              <a:rPr lang="fi-FI" sz="1100" smtClean="0"/>
+              <a:rPr lang="fi-FI" sz="1100"/>
               <a:t>.map( )</a:t>
             </a:r>
-            <a:endParaRPr lang="fi-FI" sz="1100"/>
           </a:p>
         </p:txBody>
       </p:sp>
@@ -10594,10 +10534,9 @@
           <a:lstStyle/>
           <a:p>
             <a:r>
-              <a:rPr lang="fi-FI" sz="1100" smtClean="0"/>
+              <a:rPr lang="fi-FI" sz="1100"/>
               <a:t>asynchronous</a:t>
             </a:r>
-            <a:endParaRPr lang="fi-FI" sz="1100"/>
           </a:p>
         </p:txBody>
       </p:sp>
@@ -10687,7 +10626,7 @@
           <a:p>
             <a:pPr algn="ctr"/>
             <a:r>
-              <a:rPr lang="fi-FI" sz="1300" smtClean="0">
+              <a:rPr lang="fi-FI" sz="1300">
                 <a:solidFill>
                   <a:schemeClr val="tx1"/>
                 </a:solidFill>
@@ -10749,7 +10688,7 @@
           <a:p>
             <a:pPr algn="ctr"/>
             <a:r>
-              <a:rPr lang="fi-FI" sz="1300" smtClean="0">
+              <a:rPr lang="fi-FI" sz="1300">
                 <a:solidFill>
                   <a:schemeClr val="tx1"/>
                 </a:solidFill>
@@ -10786,165 +10725,331 @@
           <a:lstStyle/>
           <a:p>
             <a:r>
-              <a:rPr lang="fi-FI" smtClean="0">
+              <a:rPr lang="fi-FI" dirty="0">
                 <a:solidFill>
                   <a:srgbClr val="0070C0"/>
                 </a:solidFill>
               </a:rPr>
               <a:t>”1”</a:t>
             </a:r>
-            <a:endParaRPr lang="fi-FI">
+          </a:p>
+        </p:txBody>
+      </p:sp>
+      <p:sp>
+        <p:nvSpPr>
+          <p:cNvPr id="186" name="Rectangle 185"/>
+          <p:cNvSpPr/>
+          <p:nvPr/>
+        </p:nvSpPr>
+        <p:spPr>
+          <a:xfrm>
+            <a:off x="9279011" y="233476"/>
+            <a:ext cx="494046" cy="369332"/>
+          </a:xfrm>
+          <a:prstGeom prst="rect">
+            <a:avLst/>
+          </a:prstGeom>
+        </p:spPr>
+        <p:txBody>
+          <a:bodyPr wrap="none">
+            <a:spAutoFit/>
+          </a:bodyPr>
+          <a:lstStyle/>
+          <a:p>
+            <a:r>
+              <a:rPr lang="fi-FI">
+                <a:solidFill>
+                  <a:srgbClr val="0070C0"/>
+                </a:solidFill>
+              </a:rPr>
+              <a:t>”2”</a:t>
+            </a:r>
+          </a:p>
+        </p:txBody>
+      </p:sp>
+      <p:sp>
+        <p:nvSpPr>
+          <p:cNvPr id="187" name="Rectangle 186"/>
+          <p:cNvSpPr/>
+          <p:nvPr/>
+        </p:nvSpPr>
+        <p:spPr>
+          <a:xfrm>
+            <a:off x="8839178" y="1774287"/>
+            <a:ext cx="494046" cy="369332"/>
+          </a:xfrm>
+          <a:prstGeom prst="rect">
+            <a:avLst/>
+          </a:prstGeom>
+        </p:spPr>
+        <p:txBody>
+          <a:bodyPr wrap="none">
+            <a:spAutoFit/>
+          </a:bodyPr>
+          <a:lstStyle/>
+          <a:p>
+            <a:r>
+              <a:rPr lang="fi-FI">
+                <a:solidFill>
+                  <a:srgbClr val="0070C0"/>
+                </a:solidFill>
+              </a:rPr>
+              <a:t>”3”</a:t>
+            </a:r>
+          </a:p>
+        </p:txBody>
+      </p:sp>
+      <p:sp>
+        <p:nvSpPr>
+          <p:cNvPr id="188" name="Rectangle 187"/>
+          <p:cNvSpPr/>
+          <p:nvPr/>
+        </p:nvSpPr>
+        <p:spPr>
+          <a:xfrm>
+            <a:off x="5141072" y="6021739"/>
+            <a:ext cx="4267515" cy="707886"/>
+          </a:xfrm>
+          <a:prstGeom prst="rect">
+            <a:avLst/>
+          </a:prstGeom>
+        </p:spPr>
+        <p:txBody>
+          <a:bodyPr wrap="none">
+            <a:spAutoFit/>
+          </a:bodyPr>
+          <a:lstStyle/>
+          <a:p>
+            <a:r>
+              <a:rPr lang="fi-FI" sz="1100" dirty="0" err="1">
+                <a:solidFill>
+                  <a:srgbClr val="0070C0"/>
+                </a:solidFill>
+              </a:rPr>
+              <a:t>later</a:t>
+            </a:r>
+            <a:r>
+              <a:rPr lang="fi-FI" sz="1100" dirty="0">
+                <a:solidFill>
+                  <a:srgbClr val="0070C0"/>
+                </a:solidFill>
+              </a:rPr>
+              <a:t> </a:t>
+            </a:r>
+            <a:r>
+              <a:rPr lang="fi-FI" dirty="0">
+                <a:solidFill>
+                  <a:srgbClr val="0070C0"/>
+                </a:solidFill>
+              </a:rPr>
+              <a:t>”4” </a:t>
+            </a:r>
+            <a:r>
+              <a:rPr lang="fi-FI" sz="1100" dirty="0" err="1">
+                <a:solidFill>
+                  <a:srgbClr val="0070C0"/>
+                </a:solidFill>
+              </a:rPr>
+              <a:t>views</a:t>
+            </a:r>
+            <a:endParaRPr lang="fi-FI" sz="1100" dirty="0">
               <a:solidFill>
                 <a:srgbClr val="0070C0"/>
               </a:solidFill>
             </a:endParaRPr>
           </a:p>
-        </p:txBody>
-      </p:sp>
-      <p:sp>
-        <p:nvSpPr>
-          <p:cNvPr id="186" name="Rectangle 185"/>
-          <p:cNvSpPr/>
-          <p:nvPr/>
-        </p:nvSpPr>
-        <p:spPr>
-          <a:xfrm>
-            <a:off x="9279011" y="233476"/>
-            <a:ext cx="494046" cy="369332"/>
-          </a:xfrm>
-          <a:prstGeom prst="rect">
-            <a:avLst/>
-          </a:prstGeom>
-        </p:spPr>
-        <p:txBody>
-          <a:bodyPr wrap="none">
-            <a:spAutoFit/>
-          </a:bodyPr>
-          <a:lstStyle/>
-          <a:p>
-            <a:r>
-              <a:rPr lang="fi-FI" smtClean="0">
+          <a:p>
+            <a:r>
+              <a:rPr lang="fi-FI" sz="1100" dirty="0" err="1">
                 <a:solidFill>
                   <a:srgbClr val="0070C0"/>
                 </a:solidFill>
               </a:rPr>
-              <a:t>”2”</a:t>
-            </a:r>
-            <a:endParaRPr lang="fi-FI">
+              <a:t>automatically</a:t>
+            </a:r>
+            <a:r>
+              <a:rPr lang="fi-FI" sz="1100" dirty="0">
+                <a:solidFill>
+                  <a:srgbClr val="0070C0"/>
+                </a:solidFill>
+              </a:rPr>
+              <a:t> </a:t>
+            </a:r>
+            <a:r>
+              <a:rPr lang="fi-FI" sz="1100" dirty="0" err="1">
+                <a:solidFill>
+                  <a:srgbClr val="0070C0"/>
+                </a:solidFill>
+              </a:rPr>
+              <a:t>re-render</a:t>
+            </a:r>
+            <a:endParaRPr lang="fi-FI" sz="1100" dirty="0">
               <a:solidFill>
                 <a:srgbClr val="0070C0"/>
               </a:solidFill>
             </a:endParaRPr>
           </a:p>
-        </p:txBody>
-      </p:sp>
-      <p:sp>
-        <p:nvSpPr>
-          <p:cNvPr id="187" name="Rectangle 186"/>
-          <p:cNvSpPr/>
-          <p:nvPr/>
-        </p:nvSpPr>
-        <p:spPr>
-          <a:xfrm>
-            <a:off x="8839178" y="1774287"/>
-            <a:ext cx="494046" cy="369332"/>
-          </a:xfrm>
-          <a:prstGeom prst="rect">
-            <a:avLst/>
-          </a:prstGeom>
-        </p:spPr>
-        <p:txBody>
-          <a:bodyPr wrap="none">
-            <a:spAutoFit/>
-          </a:bodyPr>
-          <a:lstStyle/>
-          <a:p>
-            <a:r>
-              <a:rPr lang="fi-FI" smtClean="0">
+          <a:p>
+            <a:r>
+              <a:rPr lang="fi-FI" sz="1100" dirty="0" err="1">
                 <a:solidFill>
                   <a:srgbClr val="0070C0"/>
                 </a:solidFill>
               </a:rPr>
-              <a:t>”3”</a:t>
-            </a:r>
-            <a:endParaRPr lang="fi-FI">
-              <a:solidFill>
-                <a:srgbClr val="0070C0"/>
-              </a:solidFill>
-            </a:endParaRPr>
-          </a:p>
-        </p:txBody>
-      </p:sp>
-      <p:sp>
-        <p:nvSpPr>
-          <p:cNvPr id="188" name="Rectangle 187"/>
-          <p:cNvSpPr/>
-          <p:nvPr/>
-        </p:nvSpPr>
-        <p:spPr>
-          <a:xfrm>
-            <a:off x="5141072" y="6021739"/>
-            <a:ext cx="4267515" cy="707886"/>
-          </a:xfrm>
-          <a:prstGeom prst="rect">
-            <a:avLst/>
-          </a:prstGeom>
-        </p:spPr>
-        <p:txBody>
-          <a:bodyPr wrap="none">
-            <a:spAutoFit/>
-          </a:bodyPr>
-          <a:lstStyle/>
-          <a:p>
-            <a:r>
-              <a:rPr lang="fi-FI" sz="1100" smtClean="0">
+              <a:t>because</a:t>
+            </a:r>
+            <a:r>
+              <a:rPr lang="fi-FI" sz="1100" dirty="0">
                 <a:solidFill>
                   <a:srgbClr val="0070C0"/>
                 </a:solidFill>
               </a:rPr>
-              <a:t>later </a:t>
-            </a:r>
-            <a:r>
-              <a:rPr lang="fi-FI" smtClean="0">
+              <a:t> </a:t>
+            </a:r>
+            <a:r>
+              <a:rPr lang="fi-FI" sz="1100" dirty="0" err="1">
                 <a:solidFill>
                   <a:srgbClr val="0070C0"/>
                 </a:solidFill>
               </a:rPr>
-              <a:t>”4” </a:t>
-            </a:r>
-            <a:r>
-              <a:rPr lang="fi-FI" sz="1100" smtClean="0">
+              <a:t>mapped</a:t>
+            </a:r>
+            <a:r>
+              <a:rPr lang="fi-FI" sz="1100" dirty="0">
                 <a:solidFill>
                   <a:srgbClr val="0070C0"/>
                 </a:solidFill>
               </a:rPr>
-              <a:t>views</a:t>
-            </a:r>
-          </a:p>
-          <a:p>
-            <a:r>
-              <a:rPr lang="fi-FI" sz="1100" smtClean="0">
+              <a:t> </a:t>
+            </a:r>
+            <a:r>
+              <a:rPr lang="fi-FI" sz="1100" dirty="0" err="1">
                 <a:solidFill>
                   <a:srgbClr val="0070C0"/>
                 </a:solidFill>
               </a:rPr>
-              <a:t>automatically re-render</a:t>
-            </a:r>
-          </a:p>
-          <a:p>
-            <a:r>
-              <a:rPr lang="fi-FI" sz="1100" smtClean="0">
+              <a:t>props</a:t>
+            </a:r>
+            <a:r>
+              <a:rPr lang="fi-FI" sz="1100" dirty="0">
                 <a:solidFill>
                   <a:srgbClr val="0070C0"/>
                 </a:solidFill>
               </a:rPr>
-              <a:t>because mapped props change. We don’t change the view data directly.</a:t>
-            </a:r>
-            <a:endParaRPr lang="fi-FI" sz="1100">
-              <a:solidFill>
-                <a:srgbClr val="0070C0"/>
-              </a:solidFill>
-            </a:endParaRPr>
+              <a:t> </a:t>
+            </a:r>
+            <a:r>
+              <a:rPr lang="fi-FI" sz="1100" dirty="0" err="1">
+                <a:solidFill>
+                  <a:srgbClr val="0070C0"/>
+                </a:solidFill>
+              </a:rPr>
+              <a:t>change</a:t>
+            </a:r>
+            <a:r>
+              <a:rPr lang="fi-FI" sz="1100" dirty="0">
+                <a:solidFill>
+                  <a:srgbClr val="0070C0"/>
+                </a:solidFill>
+              </a:rPr>
+              <a:t>. </a:t>
+            </a:r>
+            <a:r>
+              <a:rPr lang="fi-FI" sz="1100" dirty="0" err="1">
+                <a:solidFill>
+                  <a:srgbClr val="0070C0"/>
+                </a:solidFill>
+              </a:rPr>
+              <a:t>We</a:t>
+            </a:r>
+            <a:r>
+              <a:rPr lang="fi-FI" sz="1100" dirty="0">
+                <a:solidFill>
+                  <a:srgbClr val="0070C0"/>
+                </a:solidFill>
+              </a:rPr>
+              <a:t> </a:t>
+            </a:r>
+            <a:r>
+              <a:rPr lang="fi-FI" sz="1100" dirty="0" err="1">
+                <a:solidFill>
+                  <a:srgbClr val="0070C0"/>
+                </a:solidFill>
+              </a:rPr>
+              <a:t>don’t</a:t>
+            </a:r>
+            <a:r>
+              <a:rPr lang="fi-FI" sz="1100" dirty="0">
+                <a:solidFill>
+                  <a:srgbClr val="0070C0"/>
+                </a:solidFill>
+              </a:rPr>
+              <a:t> </a:t>
+            </a:r>
+            <a:r>
+              <a:rPr lang="fi-FI" sz="1100" dirty="0" err="1">
+                <a:solidFill>
+                  <a:srgbClr val="0070C0"/>
+                </a:solidFill>
+              </a:rPr>
+              <a:t>change</a:t>
+            </a:r>
+            <a:r>
+              <a:rPr lang="fi-FI" sz="1100" dirty="0">
+                <a:solidFill>
+                  <a:srgbClr val="0070C0"/>
+                </a:solidFill>
+              </a:rPr>
+              <a:t> </a:t>
+            </a:r>
+            <a:r>
+              <a:rPr lang="fi-FI" sz="1100" dirty="0" err="1">
+                <a:solidFill>
+                  <a:srgbClr val="0070C0"/>
+                </a:solidFill>
+              </a:rPr>
+              <a:t>the</a:t>
+            </a:r>
+            <a:r>
+              <a:rPr lang="fi-FI" sz="1100" dirty="0">
+                <a:solidFill>
+                  <a:srgbClr val="0070C0"/>
+                </a:solidFill>
+              </a:rPr>
+              <a:t> </a:t>
+            </a:r>
+            <a:r>
+              <a:rPr lang="fi-FI" sz="1100" dirty="0" err="1">
+                <a:solidFill>
+                  <a:srgbClr val="0070C0"/>
+                </a:solidFill>
+              </a:rPr>
+              <a:t>view</a:t>
+            </a:r>
+            <a:r>
+              <a:rPr lang="fi-FI" sz="1100" dirty="0">
+                <a:solidFill>
+                  <a:srgbClr val="0070C0"/>
+                </a:solidFill>
+              </a:rPr>
+              <a:t> data </a:t>
+            </a:r>
+            <a:r>
+              <a:rPr lang="fi-FI" sz="1100" dirty="0" err="1">
+                <a:solidFill>
+                  <a:srgbClr val="0070C0"/>
+                </a:solidFill>
+              </a:rPr>
+              <a:t>directly</a:t>
+            </a:r>
+            <a:r>
+              <a:rPr lang="fi-FI" sz="1100" dirty="0">
+                <a:solidFill>
+                  <a:srgbClr val="0070C0"/>
+                </a:solidFill>
+              </a:rPr>
+              <a:t>.</a:t>
+            </a:r>
           </a:p>
         </p:txBody>
       </p:sp>
@@ -10995,7 +11100,7 @@
           <a:p>
             <a:pPr algn="ctr"/>
             <a:r>
-              <a:rPr lang="fi-FI" sz="1000" smtClean="0">
+              <a:rPr lang="fi-FI" sz="1000">
                 <a:solidFill>
                   <a:schemeClr val="tx1"/>
                 </a:solidFill>
@@ -11003,7 +11108,7 @@
               <a:t>Redux </a:t>
             </a:r>
             <a:r>
-              <a:rPr lang="fi-FI" sz="1000" b="1" smtClean="0">
+              <a:rPr lang="fi-FI" sz="1000" b="1">
                 <a:solidFill>
                   <a:schemeClr val="tx1"/>
                 </a:solidFill>
@@ -11139,9 +11244,10 @@
           <a:lstStyle/>
           <a:p>
             <a:r>
-              <a:rPr lang="fi-FI" sz="1100"/>
+              <a:rPr lang="fi-FI" sz="1100" dirty="0" err="1"/>
               <a:t>asynchronous</a:t>
             </a:r>
+            <a:endParaRPr lang="fi-FI" sz="1100" dirty="0"/>
           </a:p>
         </p:txBody>
       </p:sp>
@@ -11167,10 +11273,9 @@
           <a:lstStyle/>
           <a:p>
             <a:r>
-              <a:rPr lang="fi-FI" sz="1100" smtClean="0"/>
+              <a:rPr lang="fi-FI" sz="1100"/>
               <a:t>componentDidMount</a:t>
             </a:r>
-            <a:endParaRPr lang="fi-FI" sz="1100"/>
           </a:p>
         </p:txBody>
       </p:sp>
@@ -11243,6 +11348,186 @@
             <a:r>
               <a:rPr lang="fi-FI" sz="1100"/>
               <a:t>asynchronous</a:t>
+            </a:r>
+          </a:p>
+        </p:txBody>
+      </p:sp>
+      <p:sp>
+        <p:nvSpPr>
+          <p:cNvPr id="194" name="Rectangle 193">
+            <a:extLst>
+              <a:ext uri="{FF2B5EF4-FFF2-40B4-BE49-F238E27FC236}">
+                <a16:creationId xmlns:a16="http://schemas.microsoft.com/office/drawing/2014/main" id="{1EE24084-A58E-4D81-BBBE-720CE74DCFCB}"/>
+              </a:ext>
+            </a:extLst>
+          </p:cNvPr>
+          <p:cNvSpPr/>
+          <p:nvPr/>
+        </p:nvSpPr>
+        <p:spPr>
+          <a:xfrm>
+            <a:off x="8245969" y="721865"/>
+            <a:ext cx="363411" cy="207503"/>
+          </a:xfrm>
+          <a:prstGeom prst="rect">
+            <a:avLst/>
+          </a:prstGeom>
+          <a:noFill/>
+          <a:ln w="3175">
+            <a:solidFill>
+              <a:schemeClr val="tx1"/>
+            </a:solidFill>
+          </a:ln>
+        </p:spPr>
+        <p:style>
+          <a:lnRef idx="2">
+            <a:schemeClr val="accent1">
+              <a:shade val="50000"/>
+            </a:schemeClr>
+          </a:lnRef>
+          <a:fillRef idx="1">
+            <a:schemeClr val="accent1"/>
+          </a:fillRef>
+          <a:effectRef idx="0">
+            <a:schemeClr val="accent1"/>
+          </a:effectRef>
+          <a:fontRef idx="minor">
+            <a:schemeClr val="lt1"/>
+          </a:fontRef>
+        </p:style>
+        <p:txBody>
+          <a:bodyPr rtlCol="0" anchor="ctr"/>
+          <a:lstStyle/>
+          <a:p>
+            <a:pPr algn="ctr"/>
+            <a:r>
+              <a:rPr lang="en-US" sz="1000" dirty="0" err="1">
+                <a:solidFill>
+                  <a:sysClr val="windowText" lastClr="000000"/>
+                </a:solidFill>
+              </a:rPr>
+              <a:t>xhr</a:t>
+            </a:r>
+            <a:endParaRPr lang="en-US" sz="1000" dirty="0">
+              <a:solidFill>
+                <a:sysClr val="windowText" lastClr="000000"/>
+              </a:solidFill>
+            </a:endParaRPr>
+          </a:p>
+        </p:txBody>
+      </p:sp>
+      <p:sp>
+        <p:nvSpPr>
+          <p:cNvPr id="24" name="Rectangle 23">
+            <a:extLst>
+              <a:ext uri="{FF2B5EF4-FFF2-40B4-BE49-F238E27FC236}">
+                <a16:creationId xmlns:a16="http://schemas.microsoft.com/office/drawing/2014/main" id="{CA5B5C75-D912-48A4-B3AB-20DD82928279}"/>
+              </a:ext>
+            </a:extLst>
+          </p:cNvPr>
+          <p:cNvSpPr/>
+          <p:nvPr/>
+        </p:nvSpPr>
+        <p:spPr>
+          <a:xfrm>
+            <a:off x="137834" y="1157996"/>
+            <a:ext cx="982961" cy="1169551"/>
+          </a:xfrm>
+          <a:prstGeom prst="rect">
+            <a:avLst/>
+          </a:prstGeom>
+        </p:spPr>
+        <p:txBody>
+          <a:bodyPr wrap="none">
+            <a:spAutoFit/>
+          </a:bodyPr>
+          <a:lstStyle/>
+          <a:p>
+            <a:r>
+              <a:rPr lang="fi-FI" sz="1000" dirty="0"/>
+              <a:t>(((       , </a:t>
+            </a:r>
+            <a:r>
+              <a:rPr lang="fi-FI" sz="1000" dirty="0" err="1"/>
+              <a:t>user</a:t>
+            </a:r>
+            <a:endParaRPr lang="fi-FI" sz="1000" dirty="0"/>
+          </a:p>
+          <a:p>
+            <a:r>
+              <a:rPr lang="en-US" sz="1000" dirty="0"/>
+              <a:t>clicks a button/</a:t>
+            </a:r>
+          </a:p>
+          <a:p>
+            <a:r>
+              <a:rPr lang="en-US" sz="1000" dirty="0"/>
+              <a:t>link or</a:t>
+            </a:r>
+          </a:p>
+          <a:p>
+            <a:r>
+              <a:rPr lang="en-US" sz="1000" dirty="0"/>
+              <a:t>writes to </a:t>
+            </a:r>
+            <a:br>
+              <a:rPr lang="en-US" sz="1000" dirty="0"/>
+            </a:br>
+            <a:r>
+              <a:rPr lang="en-US" sz="1000" dirty="0"/>
+              <a:t>some search</a:t>
+            </a:r>
+            <a:br>
+              <a:rPr lang="en-US" sz="1000" dirty="0"/>
+            </a:br>
+            <a:r>
+              <a:rPr lang="en-US" sz="1000" dirty="0"/>
+              <a:t>or filter </a:t>
+            </a:r>
+          </a:p>
+          <a:p>
+            <a:r>
+              <a:rPr lang="en-US" sz="1000" dirty="0"/>
+              <a:t>field)))</a:t>
+            </a:r>
+            <a:endParaRPr lang="fi-FI" sz="1000" dirty="0"/>
+          </a:p>
+        </p:txBody>
+      </p:sp>
+      <p:sp>
+        <p:nvSpPr>
+          <p:cNvPr id="195" name="Rectangle 194">
+            <a:extLst>
+              <a:ext uri="{FF2B5EF4-FFF2-40B4-BE49-F238E27FC236}">
+                <a16:creationId xmlns:a16="http://schemas.microsoft.com/office/drawing/2014/main" id="{B2C2723D-9E3A-48E1-A472-F26D4F213209}"/>
+              </a:ext>
+            </a:extLst>
+          </p:cNvPr>
+          <p:cNvSpPr/>
+          <p:nvPr/>
+        </p:nvSpPr>
+        <p:spPr>
+          <a:xfrm>
+            <a:off x="192146" y="1070270"/>
+            <a:ext cx="494046" cy="369332"/>
+          </a:xfrm>
+          <a:prstGeom prst="rect">
+            <a:avLst/>
+          </a:prstGeom>
+        </p:spPr>
+        <p:txBody>
+          <a:bodyPr wrap="none">
+            <a:spAutoFit/>
+          </a:bodyPr>
+          <a:lstStyle/>
+          <a:p>
+            <a:r>
+              <a:rPr lang="fi-FI" dirty="0">
+                <a:solidFill>
+                  <a:srgbClr val="0070C0"/>
+                </a:solidFill>
+              </a:rPr>
+              <a:t>”0”</a:t>
             </a:r>
           </a:p>
         </p:txBody>
@@ -11257,13 +11542,6 @@
   <p:clrMapOvr>
     <a:masterClrMapping/>
   </p:clrMapOvr>
-  <p:timing>
-    <p:tnLst>
-      <p:par>
-        <p:cTn id="1" dur="indefinite" restart="never" nodeType="tmRoot"/>
-      </p:par>
-    </p:tnLst>
-  </p:timing>
 </p:sld>
 </file>
 

</xml_diff>